<commit_message>
Forslag til "avslutning" i Mu
</commit_message>
<xml_diff>
--- a/_drafts/Oppgaver/Workshop/Workshop_2PP.pptx
+++ b/_drafts/Oppgaver/Workshop/Workshop_2PP.pptx
@@ -7,7 +7,7 @@
     <p:sldMasterId id="2147483692" r:id="rId6"/>
   </p:sldMasterIdLst>
   <p:notesMasterIdLst>
-    <p:notesMasterId r:id="rId20"/>
+    <p:notesMasterId r:id="rId28"/>
   </p:notesMasterIdLst>
   <p:sldIdLst>
     <p:sldId id="257" r:id="rId7"/>
@@ -22,7 +22,15 @@
     <p:sldId id="282" r:id="rId16"/>
     <p:sldId id="283" r:id="rId17"/>
     <p:sldId id="284" r:id="rId18"/>
-    <p:sldId id="270" r:id="rId19"/>
+    <p:sldId id="285" r:id="rId19"/>
+    <p:sldId id="286" r:id="rId20"/>
+    <p:sldId id="291" r:id="rId21"/>
+    <p:sldId id="292" r:id="rId22"/>
+    <p:sldId id="293" r:id="rId23"/>
+    <p:sldId id="287" r:id="rId24"/>
+    <p:sldId id="288" r:id="rId25"/>
+    <p:sldId id="289" r:id="rId26"/>
+    <p:sldId id="270" r:id="rId27"/>
   </p:sldIdLst>
   <p:sldSz cx="12192000" cy="6858000"/>
   <p:notesSz cx="6858000" cy="9144000"/>
@@ -132,7 +140,7 @@
 <file path=ppt/revisionInfo.xml><?xml version="1.0" encoding="utf-8"?>
 <p1510:revInfo xmlns:a="http://schemas.openxmlformats.org/drawingml/2006/main" xmlns:r="http://schemas.openxmlformats.org/officeDocument/2006/relationships" xmlns:p1510="http://schemas.microsoft.com/office/powerpoint/2015/10/main">
   <p1510:revLst>
-    <p1510:client id="{CC2E105E-BB4D-42C2-B1F2-7BEBE9E9C317}" v="297" dt="2020-11-23T14:01:53.518"/>
+    <p1510:client id="{CC2E105E-BB4D-42C2-B1F2-7BEBE9E9C317}" v="331" dt="2020-11-23T14:50:58.728"/>
   </p1510:revLst>
 </p1510:revInfo>
 </file>
@@ -205,7 +213,7 @@
   <pc:docChgLst>
     <pc:chgData name="Henrik Løvik Njølstad" userId="778659e2-5eca-412f-ba00-4d07a820fe1f" providerId="ADAL" clId="{CC2E105E-BB4D-42C2-B1F2-7BEBE9E9C317}"/>
     <pc:docChg chg="undo custSel addSld delSld modSld sldOrd">
-      <pc:chgData name="Henrik Løvik Njølstad" userId="778659e2-5eca-412f-ba00-4d07a820fe1f" providerId="ADAL" clId="{CC2E105E-BB4D-42C2-B1F2-7BEBE9E9C317}" dt="2020-11-23T14:02:03.870" v="1068" actId="478"/>
+      <pc:chgData name="Henrik Løvik Njølstad" userId="778659e2-5eca-412f-ba00-4d07a820fe1f" providerId="ADAL" clId="{CC2E105E-BB4D-42C2-B1F2-7BEBE9E9C317}" dt="2020-11-23T14:51:49.978" v="1285" actId="20577"/>
       <pc:docMkLst>
         <pc:docMk/>
       </pc:docMkLst>
@@ -503,14 +511,14 @@
           </ac:picMkLst>
         </pc:picChg>
       </pc:sldChg>
-      <pc:sldChg chg="addSp delSp modSp add mod">
-        <pc:chgData name="Henrik Løvik Njølstad" userId="778659e2-5eca-412f-ba00-4d07a820fe1f" providerId="ADAL" clId="{CC2E105E-BB4D-42C2-B1F2-7BEBE9E9C317}" dt="2020-11-23T14:02:00.032" v="1067" actId="1076"/>
+      <pc:sldChg chg="addSp delSp modSp add mod modAnim">
+        <pc:chgData name="Henrik Løvik Njølstad" userId="778659e2-5eca-412f-ba00-4d07a820fe1f" providerId="ADAL" clId="{CC2E105E-BB4D-42C2-B1F2-7BEBE9E9C317}" dt="2020-11-23T14:42:15.048" v="1089"/>
         <pc:sldMkLst>
           <pc:docMk/>
           <pc:sldMk cId="1957482780" sldId="280"/>
         </pc:sldMkLst>
         <pc:spChg chg="mod">
-          <ac:chgData name="Henrik Løvik Njølstad" userId="778659e2-5eca-412f-ba00-4d07a820fe1f" providerId="ADAL" clId="{CC2E105E-BB4D-42C2-B1F2-7BEBE9E9C317}" dt="2020-11-19T14:11:43.816" v="643" actId="20577"/>
+          <ac:chgData name="Henrik Løvik Njølstad" userId="778659e2-5eca-412f-ba00-4d07a820fe1f" providerId="ADAL" clId="{CC2E105E-BB4D-42C2-B1F2-7BEBE9E9C317}" dt="2020-11-23T14:41:48.907" v="1084" actId="20577"/>
           <ac:spMkLst>
             <pc:docMk/>
             <pc:sldMk cId="1957482780" sldId="280"/>
@@ -525,12 +533,52 @@
             <ac:picMk id="4" creationId="{BF3BFAC4-C137-47D3-A75E-410694DE6322}"/>
           </ac:picMkLst>
         </pc:picChg>
-        <pc:picChg chg="add mod">
-          <ac:chgData name="Henrik Løvik Njølstad" userId="778659e2-5eca-412f-ba00-4d07a820fe1f" providerId="ADAL" clId="{CC2E105E-BB4D-42C2-B1F2-7BEBE9E9C317}" dt="2020-11-23T14:02:00.032" v="1067" actId="1076"/>
+        <pc:picChg chg="add del mod">
+          <ac:chgData name="Henrik Løvik Njølstad" userId="778659e2-5eca-412f-ba00-4d07a820fe1f" providerId="ADAL" clId="{CC2E105E-BB4D-42C2-B1F2-7BEBE9E9C317}" dt="2020-11-23T14:41:27.813" v="1078" actId="478"/>
           <ac:picMkLst>
             <pc:docMk/>
             <pc:sldMk cId="1957482780" sldId="280"/>
             <ac:picMk id="6" creationId="{8EE9994E-7D7E-4F16-ACF9-D85B96375680}"/>
+          </ac:picMkLst>
+        </pc:picChg>
+        <pc:picChg chg="add del mod">
+          <ac:chgData name="Henrik Løvik Njølstad" userId="778659e2-5eca-412f-ba00-4d07a820fe1f" providerId="ADAL" clId="{CC2E105E-BB4D-42C2-B1F2-7BEBE9E9C317}" dt="2020-11-23T14:37:54.294" v="1072" actId="478"/>
+          <ac:picMkLst>
+            <pc:docMk/>
+            <pc:sldMk cId="1957482780" sldId="280"/>
+            <ac:picMk id="1026" creationId="{9BFCBA1C-CAD3-4D4D-B69E-F3D1C3CD5E4E}"/>
+          </ac:picMkLst>
+        </pc:picChg>
+        <pc:picChg chg="add del">
+          <ac:chgData name="Henrik Løvik Njølstad" userId="778659e2-5eca-412f-ba00-4d07a820fe1f" providerId="ADAL" clId="{CC2E105E-BB4D-42C2-B1F2-7BEBE9E9C317}" dt="2020-11-23T14:37:54.294" v="1072" actId="478"/>
+          <ac:picMkLst>
+            <pc:docMk/>
+            <pc:sldMk cId="1957482780" sldId="280"/>
+            <ac:picMk id="1028" creationId="{DC05D943-AC99-4AEE-95C0-1481EB016310}"/>
+          </ac:picMkLst>
+        </pc:picChg>
+        <pc:picChg chg="add del mod">
+          <ac:chgData name="Henrik Løvik Njølstad" userId="778659e2-5eca-412f-ba00-4d07a820fe1f" providerId="ADAL" clId="{CC2E105E-BB4D-42C2-B1F2-7BEBE9E9C317}" dt="2020-11-23T14:38:53.911" v="1075" actId="478"/>
+          <ac:picMkLst>
+            <pc:docMk/>
+            <pc:sldMk cId="1957482780" sldId="280"/>
+            <ac:picMk id="1030" creationId="{0E03AB79-C275-4DDD-9173-1D58A75F75B4}"/>
+          </ac:picMkLst>
+        </pc:picChg>
+        <pc:picChg chg="add mod">
+          <ac:chgData name="Henrik Løvik Njølstad" userId="778659e2-5eca-412f-ba00-4d07a820fe1f" providerId="ADAL" clId="{CC2E105E-BB4D-42C2-B1F2-7BEBE9E9C317}" dt="2020-11-23T14:42:01.109" v="1086" actId="1076"/>
+          <ac:picMkLst>
+            <pc:docMk/>
+            <pc:sldMk cId="1957482780" sldId="280"/>
+            <ac:picMk id="1032" creationId="{0FB1949E-CB87-44AD-B2AF-37A797B6240B}"/>
+          </ac:picMkLst>
+        </pc:picChg>
+        <pc:picChg chg="add mod">
+          <ac:chgData name="Henrik Løvik Njølstad" userId="778659e2-5eca-412f-ba00-4d07a820fe1f" providerId="ADAL" clId="{CC2E105E-BB4D-42C2-B1F2-7BEBE9E9C317}" dt="2020-11-23T14:42:07.298" v="1087" actId="1076"/>
+          <ac:picMkLst>
+            <pc:docMk/>
+            <pc:sldMk cId="1957482780" sldId="280"/>
+            <ac:picMk id="1034" creationId="{BF98F9A7-C1AC-44FA-ADC5-DE669DFF785F}"/>
           </ac:picMkLst>
         </pc:picChg>
       </pc:sldChg>
@@ -596,16 +644,149 @@
         </pc:spChg>
       </pc:sldChg>
       <pc:sldChg chg="modSp add mod">
-        <pc:chgData name="Henrik Løvik Njølstad" userId="778659e2-5eca-412f-ba00-4d07a820fe1f" providerId="ADAL" clId="{CC2E105E-BB4D-42C2-B1F2-7BEBE9E9C317}" dt="2020-11-20T07:47:27.247" v="1056" actId="14100"/>
+        <pc:chgData name="Henrik Løvik Njølstad" userId="778659e2-5eca-412f-ba00-4d07a820fe1f" providerId="ADAL" clId="{CC2E105E-BB4D-42C2-B1F2-7BEBE9E9C317}" dt="2020-11-23T14:44:38.618" v="1143" actId="20577"/>
         <pc:sldMkLst>
           <pc:docMk/>
           <pc:sldMk cId="1175986555" sldId="284"/>
         </pc:sldMkLst>
         <pc:spChg chg="mod">
-          <ac:chgData name="Henrik Løvik Njølstad" userId="778659e2-5eca-412f-ba00-4d07a820fe1f" providerId="ADAL" clId="{CC2E105E-BB4D-42C2-B1F2-7BEBE9E9C317}" dt="2020-11-20T07:47:27.247" v="1056" actId="14100"/>
+          <ac:chgData name="Henrik Løvik Njølstad" userId="778659e2-5eca-412f-ba00-4d07a820fe1f" providerId="ADAL" clId="{CC2E105E-BB4D-42C2-B1F2-7BEBE9E9C317}" dt="2020-11-23T14:44:38.618" v="1143" actId="20577"/>
           <ac:spMkLst>
             <pc:docMk/>
             <pc:sldMk cId="1175986555" sldId="284"/>
+            <ac:spMk id="3" creationId="{18166937-65B3-4DC8-BB43-63584E0D60E0}"/>
+          </ac:spMkLst>
+        </pc:spChg>
+      </pc:sldChg>
+      <pc:sldChg chg="add">
+        <pc:chgData name="Henrik Løvik Njølstad" userId="778659e2-5eca-412f-ba00-4d07a820fe1f" providerId="ADAL" clId="{CC2E105E-BB4D-42C2-B1F2-7BEBE9E9C317}" dt="2020-11-23T14:44:33.998" v="1140"/>
+        <pc:sldMkLst>
+          <pc:docMk/>
+          <pc:sldMk cId="1856889016" sldId="285"/>
+        </pc:sldMkLst>
+      </pc:sldChg>
+      <pc:sldChg chg="addSp modSp add del mod">
+        <pc:chgData name="Henrik Løvik Njølstad" userId="778659e2-5eca-412f-ba00-4d07a820fe1f" providerId="ADAL" clId="{CC2E105E-BB4D-42C2-B1F2-7BEBE9E9C317}" dt="2020-11-23T14:50:00.956" v="1231" actId="47"/>
+        <pc:sldMkLst>
+          <pc:docMk/>
+          <pc:sldMk cId="59968565" sldId="286"/>
+        </pc:sldMkLst>
+        <pc:spChg chg="mod">
+          <ac:chgData name="Henrik Løvik Njølstad" userId="778659e2-5eca-412f-ba00-4d07a820fe1f" providerId="ADAL" clId="{CC2E105E-BB4D-42C2-B1F2-7BEBE9E9C317}" dt="2020-11-23T14:49:21.352" v="1220" actId="20577"/>
+          <ac:spMkLst>
+            <pc:docMk/>
+            <pc:sldMk cId="59968565" sldId="286"/>
+            <ac:spMk id="3" creationId="{18166937-65B3-4DC8-BB43-63584E0D60E0}"/>
+          </ac:spMkLst>
+        </pc:spChg>
+        <pc:picChg chg="add mod">
+          <ac:chgData name="Henrik Løvik Njølstad" userId="778659e2-5eca-412f-ba00-4d07a820fe1f" providerId="ADAL" clId="{CC2E105E-BB4D-42C2-B1F2-7BEBE9E9C317}" dt="2020-11-23T14:47:36.437" v="1148" actId="1076"/>
+          <ac:picMkLst>
+            <pc:docMk/>
+            <pc:sldMk cId="59968565" sldId="286"/>
+            <ac:picMk id="2050" creationId="{497BAC9D-3202-437C-B12B-E3164F1AB1E7}"/>
+          </ac:picMkLst>
+        </pc:picChg>
+      </pc:sldChg>
+      <pc:sldChg chg="modSp add mod">
+        <pc:chgData name="Henrik Løvik Njølstad" userId="778659e2-5eca-412f-ba00-4d07a820fe1f" providerId="ADAL" clId="{CC2E105E-BB4D-42C2-B1F2-7BEBE9E9C317}" dt="2020-11-23T14:51:16.617" v="1269" actId="6549"/>
+        <pc:sldMkLst>
+          <pc:docMk/>
+          <pc:sldMk cId="3470671077" sldId="287"/>
+        </pc:sldMkLst>
+        <pc:spChg chg="mod">
+          <ac:chgData name="Henrik Løvik Njølstad" userId="778659e2-5eca-412f-ba00-4d07a820fe1f" providerId="ADAL" clId="{CC2E105E-BB4D-42C2-B1F2-7BEBE9E9C317}" dt="2020-11-23T14:51:16.617" v="1269" actId="6549"/>
+          <ac:spMkLst>
+            <pc:docMk/>
+            <pc:sldMk cId="3470671077" sldId="287"/>
+            <ac:spMk id="3" creationId="{18166937-65B3-4DC8-BB43-63584E0D60E0}"/>
+          </ac:spMkLst>
+        </pc:spChg>
+      </pc:sldChg>
+      <pc:sldChg chg="modSp add mod">
+        <pc:chgData name="Henrik Løvik Njølstad" userId="778659e2-5eca-412f-ba00-4d07a820fe1f" providerId="ADAL" clId="{CC2E105E-BB4D-42C2-B1F2-7BEBE9E9C317}" dt="2020-11-23T14:49:31.482" v="1225" actId="20577"/>
+        <pc:sldMkLst>
+          <pc:docMk/>
+          <pc:sldMk cId="3513622728" sldId="288"/>
+        </pc:sldMkLst>
+        <pc:spChg chg="mod">
+          <ac:chgData name="Henrik Løvik Njølstad" userId="778659e2-5eca-412f-ba00-4d07a820fe1f" providerId="ADAL" clId="{CC2E105E-BB4D-42C2-B1F2-7BEBE9E9C317}" dt="2020-11-23T14:49:31.482" v="1225" actId="20577"/>
+          <ac:spMkLst>
+            <pc:docMk/>
+            <pc:sldMk cId="3513622728" sldId="288"/>
+            <ac:spMk id="3" creationId="{18166937-65B3-4DC8-BB43-63584E0D60E0}"/>
+          </ac:spMkLst>
+        </pc:spChg>
+      </pc:sldChg>
+      <pc:sldChg chg="add">
+        <pc:chgData name="Henrik Løvik Njølstad" userId="778659e2-5eca-412f-ba00-4d07a820fe1f" providerId="ADAL" clId="{CC2E105E-BB4D-42C2-B1F2-7BEBE9E9C317}" dt="2020-11-23T14:49:28.228" v="1223"/>
+        <pc:sldMkLst>
+          <pc:docMk/>
+          <pc:sldMk cId="436915314" sldId="289"/>
+        </pc:sldMkLst>
+      </pc:sldChg>
+      <pc:sldChg chg="add del">
+        <pc:chgData name="Henrik Løvik Njølstad" userId="778659e2-5eca-412f-ba00-4d07a820fe1f" providerId="ADAL" clId="{CC2E105E-BB4D-42C2-B1F2-7BEBE9E9C317}" dt="2020-11-23T14:49:50.962" v="1228" actId="47"/>
+        <pc:sldMkLst>
+          <pc:docMk/>
+          <pc:sldMk cId="680791875" sldId="290"/>
+        </pc:sldMkLst>
+      </pc:sldChg>
+      <pc:sldChg chg="modSp add mod">
+        <pc:chgData name="Henrik Løvik Njølstad" userId="778659e2-5eca-412f-ba00-4d07a820fe1f" providerId="ADAL" clId="{CC2E105E-BB4D-42C2-B1F2-7BEBE9E9C317}" dt="2020-11-23T14:50:27.722" v="1258" actId="20577"/>
+        <pc:sldMkLst>
+          <pc:docMk/>
+          <pc:sldMk cId="1040056657" sldId="291"/>
+        </pc:sldMkLst>
+        <pc:spChg chg="mod">
+          <ac:chgData name="Henrik Løvik Njølstad" userId="778659e2-5eca-412f-ba00-4d07a820fe1f" providerId="ADAL" clId="{CC2E105E-BB4D-42C2-B1F2-7BEBE9E9C317}" dt="2020-11-23T14:50:27.722" v="1258" actId="20577"/>
+          <ac:spMkLst>
+            <pc:docMk/>
+            <pc:sldMk cId="1040056657" sldId="291"/>
+            <ac:spMk id="3" creationId="{18166937-65B3-4DC8-BB43-63584E0D60E0}"/>
+          </ac:spMkLst>
+        </pc:spChg>
+      </pc:sldChg>
+      <pc:sldChg chg="add del">
+        <pc:chgData name="Henrik Løvik Njølstad" userId="778659e2-5eca-412f-ba00-4d07a820fe1f" providerId="ADAL" clId="{CC2E105E-BB4D-42C2-B1F2-7BEBE9E9C317}" dt="2020-11-23T14:50:28.643" v="1260"/>
+        <pc:sldMkLst>
+          <pc:docMk/>
+          <pc:sldMk cId="1219285030" sldId="292"/>
+        </pc:sldMkLst>
+      </pc:sldChg>
+      <pc:sldChg chg="modSp add mod">
+        <pc:chgData name="Henrik Løvik Njølstad" userId="778659e2-5eca-412f-ba00-4d07a820fe1f" providerId="ADAL" clId="{CC2E105E-BB4D-42C2-B1F2-7BEBE9E9C317}" dt="2020-11-23T14:50:42.127" v="1262"/>
+        <pc:sldMkLst>
+          <pc:docMk/>
+          <pc:sldMk cId="3374629622" sldId="292"/>
+        </pc:sldMkLst>
+        <pc:spChg chg="mod">
+          <ac:chgData name="Henrik Løvik Njølstad" userId="778659e2-5eca-412f-ba00-4d07a820fe1f" providerId="ADAL" clId="{CC2E105E-BB4D-42C2-B1F2-7BEBE9E9C317}" dt="2020-11-23T14:50:42.127" v="1262"/>
+          <ac:spMkLst>
+            <pc:docMk/>
+            <pc:sldMk cId="3374629622" sldId="292"/>
+            <ac:spMk id="3" creationId="{18166937-65B3-4DC8-BB43-63584E0D60E0}"/>
+          </ac:spMkLst>
+        </pc:spChg>
+      </pc:sldChg>
+      <pc:sldChg chg="add del">
+        <pc:chgData name="Henrik Løvik Njølstad" userId="778659e2-5eca-412f-ba00-4d07a820fe1f" providerId="ADAL" clId="{CC2E105E-BB4D-42C2-B1F2-7BEBE9E9C317}" dt="2020-11-23T14:50:02.935" v="1232" actId="47"/>
+        <pc:sldMkLst>
+          <pc:docMk/>
+          <pc:sldMk cId="3755456630" sldId="292"/>
+        </pc:sldMkLst>
+      </pc:sldChg>
+      <pc:sldChg chg="modSp add mod">
+        <pc:chgData name="Henrik Løvik Njølstad" userId="778659e2-5eca-412f-ba00-4d07a820fe1f" providerId="ADAL" clId="{CC2E105E-BB4D-42C2-B1F2-7BEBE9E9C317}" dt="2020-11-23T14:51:49.978" v="1285" actId="20577"/>
+        <pc:sldMkLst>
+          <pc:docMk/>
+          <pc:sldMk cId="2355140278" sldId="293"/>
+        </pc:sldMkLst>
+        <pc:spChg chg="mod">
+          <ac:chgData name="Henrik Løvik Njølstad" userId="778659e2-5eca-412f-ba00-4d07a820fe1f" providerId="ADAL" clId="{CC2E105E-BB4D-42C2-B1F2-7BEBE9E9C317}" dt="2020-11-23T14:51:49.978" v="1285" actId="20577"/>
+          <ac:spMkLst>
+            <pc:docMk/>
+            <pc:sldMk cId="2355140278" sldId="293"/>
             <ac:spMk id="3" creationId="{18166937-65B3-4DC8-BB43-63584E0D60E0}"/>
           </ac:spMkLst>
         </pc:spChg>
@@ -1702,6 +1883,90 @@
 </p:notes>
 </file>
 
+<file path=ppt/notesSlides/notesSlide10.xml><?xml version="1.0" encoding="utf-8"?>
+<p:notes xmlns:a="http://schemas.openxmlformats.org/drawingml/2006/main" xmlns:r="http://schemas.openxmlformats.org/officeDocument/2006/relationships" xmlns:p="http://schemas.openxmlformats.org/presentationml/2006/main">
+  <p:cSld>
+    <p:spTree>
+      <p:nvGrpSpPr>
+        <p:cNvPr id="1" name=""/>
+        <p:cNvGrpSpPr/>
+        <p:nvPr/>
+      </p:nvGrpSpPr>
+      <p:grpSpPr>
+        <a:xfrm>
+          <a:off x="0" y="0"/>
+          <a:ext cx="0" cy="0"/>
+          <a:chOff x="0" y="0"/>
+          <a:chExt cx="0" cy="0"/>
+        </a:xfrm>
+      </p:grpSpPr>
+      <p:sp>
+        <p:nvSpPr>
+          <p:cNvPr id="2" name="Plassholder for lysbilde 1"/>
+          <p:cNvSpPr>
+            <a:spLocks noGrp="1" noRot="1" noChangeAspect="1"/>
+          </p:cNvSpPr>
+          <p:nvPr>
+            <p:ph type="sldImg"/>
+          </p:nvPr>
+        </p:nvSpPr>
+        <p:spPr/>
+      </p:sp>
+      <p:sp>
+        <p:nvSpPr>
+          <p:cNvPr id="3" name="Plassholder for notater 2"/>
+          <p:cNvSpPr>
+            <a:spLocks noGrp="1"/>
+          </p:cNvSpPr>
+          <p:nvPr>
+            <p:ph type="body" idx="1"/>
+          </p:nvPr>
+        </p:nvSpPr>
+        <p:spPr/>
+        <p:txBody>
+          <a:bodyPr/>
+          <a:lstStyle/>
+          <a:p>
+            <a:endParaRPr lang="nb-NO" dirty="0"/>
+          </a:p>
+        </p:txBody>
+      </p:sp>
+      <p:sp>
+        <p:nvSpPr>
+          <p:cNvPr id="4" name="Plassholder for lysbildenummer 3"/>
+          <p:cNvSpPr>
+            <a:spLocks noGrp="1"/>
+          </p:cNvSpPr>
+          <p:nvPr>
+            <p:ph type="sldNum" sz="quarter" idx="5"/>
+          </p:nvPr>
+        </p:nvSpPr>
+        <p:spPr/>
+        <p:txBody>
+          <a:bodyPr/>
+          <a:lstStyle/>
+          <a:p>
+            <a:fld id="{D95B9550-F2AC-4E79-AFA1-DC160CE0C43D}" type="slidenum">
+              <a:rPr lang="nb-NO" smtClean="0"/>
+              <a:t>20</a:t>
+            </a:fld>
+            <a:endParaRPr lang="nb-NO"/>
+          </a:p>
+        </p:txBody>
+      </p:sp>
+    </p:spTree>
+    <p:extLst>
+      <p:ext uri="{BB962C8B-B14F-4D97-AF65-F5344CB8AC3E}">
+        <p14:creationId xmlns:p14="http://schemas.microsoft.com/office/powerpoint/2010/main" val="1967120508"/>
+      </p:ext>
+    </p:extLst>
+  </p:cSld>
+  <p:clrMapOvr>
+    <a:masterClrMapping/>
+  </p:clrMapOvr>
+</p:notes>
+</file>
+
 <file path=ppt/notesSlides/notesSlide2.xml><?xml version="1.0" encoding="utf-8"?>
 <p:notes xmlns:a="http://schemas.openxmlformats.org/drawingml/2006/main" xmlns:r="http://schemas.openxmlformats.org/officeDocument/2006/relationships" xmlns:p="http://schemas.openxmlformats.org/presentationml/2006/main">
   <p:cSld>
@@ -1777,6 +2042,594 @@
     <p:extLst>
       <p:ext uri="{BB962C8B-B14F-4D97-AF65-F5344CB8AC3E}">
         <p14:creationId xmlns:p14="http://schemas.microsoft.com/office/powerpoint/2010/main" val="2749309268"/>
+      </p:ext>
+    </p:extLst>
+  </p:cSld>
+  <p:clrMapOvr>
+    <a:masterClrMapping/>
+  </p:clrMapOvr>
+</p:notes>
+</file>
+
+<file path=ppt/notesSlides/notesSlide3.xml><?xml version="1.0" encoding="utf-8"?>
+<p:notes xmlns:a="http://schemas.openxmlformats.org/drawingml/2006/main" xmlns:r="http://schemas.openxmlformats.org/officeDocument/2006/relationships" xmlns:p="http://schemas.openxmlformats.org/presentationml/2006/main">
+  <p:cSld>
+    <p:spTree>
+      <p:nvGrpSpPr>
+        <p:cNvPr id="1" name=""/>
+        <p:cNvGrpSpPr/>
+        <p:nvPr/>
+      </p:nvGrpSpPr>
+      <p:grpSpPr>
+        <a:xfrm>
+          <a:off x="0" y="0"/>
+          <a:ext cx="0" cy="0"/>
+          <a:chOff x="0" y="0"/>
+          <a:chExt cx="0" cy="0"/>
+        </a:xfrm>
+      </p:grpSpPr>
+      <p:sp>
+        <p:nvSpPr>
+          <p:cNvPr id="2" name="Plassholder for lysbilde 1"/>
+          <p:cNvSpPr>
+            <a:spLocks noGrp="1" noRot="1" noChangeAspect="1"/>
+          </p:cNvSpPr>
+          <p:nvPr>
+            <p:ph type="sldImg"/>
+          </p:nvPr>
+        </p:nvSpPr>
+        <p:spPr/>
+      </p:sp>
+      <p:sp>
+        <p:nvSpPr>
+          <p:cNvPr id="3" name="Plassholder for notater 2"/>
+          <p:cNvSpPr>
+            <a:spLocks noGrp="1"/>
+          </p:cNvSpPr>
+          <p:nvPr>
+            <p:ph type="body" idx="1"/>
+          </p:nvPr>
+        </p:nvSpPr>
+        <p:spPr/>
+        <p:txBody>
+          <a:bodyPr/>
+          <a:lstStyle/>
+          <a:p>
+            <a:endParaRPr lang="nb-NO" dirty="0"/>
+          </a:p>
+        </p:txBody>
+      </p:sp>
+      <p:sp>
+        <p:nvSpPr>
+          <p:cNvPr id="4" name="Plassholder for lysbildenummer 3"/>
+          <p:cNvSpPr>
+            <a:spLocks noGrp="1"/>
+          </p:cNvSpPr>
+          <p:nvPr>
+            <p:ph type="sldNum" sz="quarter" idx="5"/>
+          </p:nvPr>
+        </p:nvSpPr>
+        <p:spPr/>
+        <p:txBody>
+          <a:bodyPr/>
+          <a:lstStyle/>
+          <a:p>
+            <a:fld id="{D95B9550-F2AC-4E79-AFA1-DC160CE0C43D}" type="slidenum">
+              <a:rPr lang="nb-NO" smtClean="0"/>
+              <a:t>13</a:t>
+            </a:fld>
+            <a:endParaRPr lang="nb-NO"/>
+          </a:p>
+        </p:txBody>
+      </p:sp>
+    </p:spTree>
+    <p:extLst>
+      <p:ext uri="{BB962C8B-B14F-4D97-AF65-F5344CB8AC3E}">
+        <p14:creationId xmlns:p14="http://schemas.microsoft.com/office/powerpoint/2010/main" val="1708859480"/>
+      </p:ext>
+    </p:extLst>
+  </p:cSld>
+  <p:clrMapOvr>
+    <a:masterClrMapping/>
+  </p:clrMapOvr>
+</p:notes>
+</file>
+
+<file path=ppt/notesSlides/notesSlide4.xml><?xml version="1.0" encoding="utf-8"?>
+<p:notes xmlns:a="http://schemas.openxmlformats.org/drawingml/2006/main" xmlns:r="http://schemas.openxmlformats.org/officeDocument/2006/relationships" xmlns:p="http://schemas.openxmlformats.org/presentationml/2006/main">
+  <p:cSld>
+    <p:spTree>
+      <p:nvGrpSpPr>
+        <p:cNvPr id="1" name=""/>
+        <p:cNvGrpSpPr/>
+        <p:nvPr/>
+      </p:nvGrpSpPr>
+      <p:grpSpPr>
+        <a:xfrm>
+          <a:off x="0" y="0"/>
+          <a:ext cx="0" cy="0"/>
+          <a:chOff x="0" y="0"/>
+          <a:chExt cx="0" cy="0"/>
+        </a:xfrm>
+      </p:grpSpPr>
+      <p:sp>
+        <p:nvSpPr>
+          <p:cNvPr id="2" name="Plassholder for lysbilde 1"/>
+          <p:cNvSpPr>
+            <a:spLocks noGrp="1" noRot="1" noChangeAspect="1"/>
+          </p:cNvSpPr>
+          <p:nvPr>
+            <p:ph type="sldImg"/>
+          </p:nvPr>
+        </p:nvSpPr>
+        <p:spPr/>
+      </p:sp>
+      <p:sp>
+        <p:nvSpPr>
+          <p:cNvPr id="3" name="Plassholder for notater 2"/>
+          <p:cNvSpPr>
+            <a:spLocks noGrp="1"/>
+          </p:cNvSpPr>
+          <p:nvPr>
+            <p:ph type="body" idx="1"/>
+          </p:nvPr>
+        </p:nvSpPr>
+        <p:spPr/>
+        <p:txBody>
+          <a:bodyPr/>
+          <a:lstStyle/>
+          <a:p>
+            <a:endParaRPr lang="nb-NO" dirty="0"/>
+          </a:p>
+        </p:txBody>
+      </p:sp>
+      <p:sp>
+        <p:nvSpPr>
+          <p:cNvPr id="4" name="Plassholder for lysbildenummer 3"/>
+          <p:cNvSpPr>
+            <a:spLocks noGrp="1"/>
+          </p:cNvSpPr>
+          <p:nvPr>
+            <p:ph type="sldNum" sz="quarter" idx="5"/>
+          </p:nvPr>
+        </p:nvSpPr>
+        <p:spPr/>
+        <p:txBody>
+          <a:bodyPr/>
+          <a:lstStyle/>
+          <a:p>
+            <a:fld id="{D95B9550-F2AC-4E79-AFA1-DC160CE0C43D}" type="slidenum">
+              <a:rPr lang="nb-NO" smtClean="0"/>
+              <a:t>14</a:t>
+            </a:fld>
+            <a:endParaRPr lang="nb-NO"/>
+          </a:p>
+        </p:txBody>
+      </p:sp>
+    </p:spTree>
+    <p:extLst>
+      <p:ext uri="{BB962C8B-B14F-4D97-AF65-F5344CB8AC3E}">
+        <p14:creationId xmlns:p14="http://schemas.microsoft.com/office/powerpoint/2010/main" val="2878090989"/>
+      </p:ext>
+    </p:extLst>
+  </p:cSld>
+  <p:clrMapOvr>
+    <a:masterClrMapping/>
+  </p:clrMapOvr>
+</p:notes>
+</file>
+
+<file path=ppt/notesSlides/notesSlide5.xml><?xml version="1.0" encoding="utf-8"?>
+<p:notes xmlns:a="http://schemas.openxmlformats.org/drawingml/2006/main" xmlns:r="http://schemas.openxmlformats.org/officeDocument/2006/relationships" xmlns:p="http://schemas.openxmlformats.org/presentationml/2006/main">
+  <p:cSld>
+    <p:spTree>
+      <p:nvGrpSpPr>
+        <p:cNvPr id="1" name=""/>
+        <p:cNvGrpSpPr/>
+        <p:nvPr/>
+      </p:nvGrpSpPr>
+      <p:grpSpPr>
+        <a:xfrm>
+          <a:off x="0" y="0"/>
+          <a:ext cx="0" cy="0"/>
+          <a:chOff x="0" y="0"/>
+          <a:chExt cx="0" cy="0"/>
+        </a:xfrm>
+      </p:grpSpPr>
+      <p:sp>
+        <p:nvSpPr>
+          <p:cNvPr id="2" name="Plassholder for lysbilde 1"/>
+          <p:cNvSpPr>
+            <a:spLocks noGrp="1" noRot="1" noChangeAspect="1"/>
+          </p:cNvSpPr>
+          <p:nvPr>
+            <p:ph type="sldImg"/>
+          </p:nvPr>
+        </p:nvSpPr>
+        <p:spPr/>
+      </p:sp>
+      <p:sp>
+        <p:nvSpPr>
+          <p:cNvPr id="3" name="Plassholder for notater 2"/>
+          <p:cNvSpPr>
+            <a:spLocks noGrp="1"/>
+          </p:cNvSpPr>
+          <p:nvPr>
+            <p:ph type="body" idx="1"/>
+          </p:nvPr>
+        </p:nvSpPr>
+        <p:spPr/>
+        <p:txBody>
+          <a:bodyPr/>
+          <a:lstStyle/>
+          <a:p>
+            <a:endParaRPr lang="nb-NO" dirty="0"/>
+          </a:p>
+        </p:txBody>
+      </p:sp>
+      <p:sp>
+        <p:nvSpPr>
+          <p:cNvPr id="4" name="Plassholder for lysbildenummer 3"/>
+          <p:cNvSpPr>
+            <a:spLocks noGrp="1"/>
+          </p:cNvSpPr>
+          <p:nvPr>
+            <p:ph type="sldNum" sz="quarter" idx="5"/>
+          </p:nvPr>
+        </p:nvSpPr>
+        <p:spPr/>
+        <p:txBody>
+          <a:bodyPr/>
+          <a:lstStyle/>
+          <a:p>
+            <a:fld id="{D95B9550-F2AC-4E79-AFA1-DC160CE0C43D}" type="slidenum">
+              <a:rPr lang="nb-NO" smtClean="0"/>
+              <a:t>15</a:t>
+            </a:fld>
+            <a:endParaRPr lang="nb-NO"/>
+          </a:p>
+        </p:txBody>
+      </p:sp>
+    </p:spTree>
+    <p:extLst>
+      <p:ext uri="{BB962C8B-B14F-4D97-AF65-F5344CB8AC3E}">
+        <p14:creationId xmlns:p14="http://schemas.microsoft.com/office/powerpoint/2010/main" val="2683542885"/>
+      </p:ext>
+    </p:extLst>
+  </p:cSld>
+  <p:clrMapOvr>
+    <a:masterClrMapping/>
+  </p:clrMapOvr>
+</p:notes>
+</file>
+
+<file path=ppt/notesSlides/notesSlide6.xml><?xml version="1.0" encoding="utf-8"?>
+<p:notes xmlns:a="http://schemas.openxmlformats.org/drawingml/2006/main" xmlns:r="http://schemas.openxmlformats.org/officeDocument/2006/relationships" xmlns:p="http://schemas.openxmlformats.org/presentationml/2006/main">
+  <p:cSld>
+    <p:spTree>
+      <p:nvGrpSpPr>
+        <p:cNvPr id="1" name=""/>
+        <p:cNvGrpSpPr/>
+        <p:nvPr/>
+      </p:nvGrpSpPr>
+      <p:grpSpPr>
+        <a:xfrm>
+          <a:off x="0" y="0"/>
+          <a:ext cx="0" cy="0"/>
+          <a:chOff x="0" y="0"/>
+          <a:chExt cx="0" cy="0"/>
+        </a:xfrm>
+      </p:grpSpPr>
+      <p:sp>
+        <p:nvSpPr>
+          <p:cNvPr id="2" name="Plassholder for lysbilde 1"/>
+          <p:cNvSpPr>
+            <a:spLocks noGrp="1" noRot="1" noChangeAspect="1"/>
+          </p:cNvSpPr>
+          <p:nvPr>
+            <p:ph type="sldImg"/>
+          </p:nvPr>
+        </p:nvSpPr>
+        <p:spPr/>
+      </p:sp>
+      <p:sp>
+        <p:nvSpPr>
+          <p:cNvPr id="3" name="Plassholder for notater 2"/>
+          <p:cNvSpPr>
+            <a:spLocks noGrp="1"/>
+          </p:cNvSpPr>
+          <p:nvPr>
+            <p:ph type="body" idx="1"/>
+          </p:nvPr>
+        </p:nvSpPr>
+        <p:spPr/>
+        <p:txBody>
+          <a:bodyPr/>
+          <a:lstStyle/>
+          <a:p>
+            <a:endParaRPr lang="nb-NO" dirty="0"/>
+          </a:p>
+        </p:txBody>
+      </p:sp>
+      <p:sp>
+        <p:nvSpPr>
+          <p:cNvPr id="4" name="Plassholder for lysbildenummer 3"/>
+          <p:cNvSpPr>
+            <a:spLocks noGrp="1"/>
+          </p:cNvSpPr>
+          <p:nvPr>
+            <p:ph type="sldNum" sz="quarter" idx="5"/>
+          </p:nvPr>
+        </p:nvSpPr>
+        <p:spPr/>
+        <p:txBody>
+          <a:bodyPr/>
+          <a:lstStyle/>
+          <a:p>
+            <a:fld id="{D95B9550-F2AC-4E79-AFA1-DC160CE0C43D}" type="slidenum">
+              <a:rPr lang="nb-NO" smtClean="0"/>
+              <a:t>16</a:t>
+            </a:fld>
+            <a:endParaRPr lang="nb-NO"/>
+          </a:p>
+        </p:txBody>
+      </p:sp>
+    </p:spTree>
+    <p:extLst>
+      <p:ext uri="{BB962C8B-B14F-4D97-AF65-F5344CB8AC3E}">
+        <p14:creationId xmlns:p14="http://schemas.microsoft.com/office/powerpoint/2010/main" val="4275217733"/>
+      </p:ext>
+    </p:extLst>
+  </p:cSld>
+  <p:clrMapOvr>
+    <a:masterClrMapping/>
+  </p:clrMapOvr>
+</p:notes>
+</file>
+
+<file path=ppt/notesSlides/notesSlide7.xml><?xml version="1.0" encoding="utf-8"?>
+<p:notes xmlns:a="http://schemas.openxmlformats.org/drawingml/2006/main" xmlns:r="http://schemas.openxmlformats.org/officeDocument/2006/relationships" xmlns:p="http://schemas.openxmlformats.org/presentationml/2006/main">
+  <p:cSld>
+    <p:spTree>
+      <p:nvGrpSpPr>
+        <p:cNvPr id="1" name=""/>
+        <p:cNvGrpSpPr/>
+        <p:nvPr/>
+      </p:nvGrpSpPr>
+      <p:grpSpPr>
+        <a:xfrm>
+          <a:off x="0" y="0"/>
+          <a:ext cx="0" cy="0"/>
+          <a:chOff x="0" y="0"/>
+          <a:chExt cx="0" cy="0"/>
+        </a:xfrm>
+      </p:grpSpPr>
+      <p:sp>
+        <p:nvSpPr>
+          <p:cNvPr id="2" name="Plassholder for lysbilde 1"/>
+          <p:cNvSpPr>
+            <a:spLocks noGrp="1" noRot="1" noChangeAspect="1"/>
+          </p:cNvSpPr>
+          <p:nvPr>
+            <p:ph type="sldImg"/>
+          </p:nvPr>
+        </p:nvSpPr>
+        <p:spPr/>
+      </p:sp>
+      <p:sp>
+        <p:nvSpPr>
+          <p:cNvPr id="3" name="Plassholder for notater 2"/>
+          <p:cNvSpPr>
+            <a:spLocks noGrp="1"/>
+          </p:cNvSpPr>
+          <p:nvPr>
+            <p:ph type="body" idx="1"/>
+          </p:nvPr>
+        </p:nvSpPr>
+        <p:spPr/>
+        <p:txBody>
+          <a:bodyPr/>
+          <a:lstStyle/>
+          <a:p>
+            <a:endParaRPr lang="nb-NO" dirty="0"/>
+          </a:p>
+        </p:txBody>
+      </p:sp>
+      <p:sp>
+        <p:nvSpPr>
+          <p:cNvPr id="4" name="Plassholder for lysbildenummer 3"/>
+          <p:cNvSpPr>
+            <a:spLocks noGrp="1"/>
+          </p:cNvSpPr>
+          <p:nvPr>
+            <p:ph type="sldNum" sz="quarter" idx="5"/>
+          </p:nvPr>
+        </p:nvSpPr>
+        <p:spPr/>
+        <p:txBody>
+          <a:bodyPr/>
+          <a:lstStyle/>
+          <a:p>
+            <a:fld id="{D95B9550-F2AC-4E79-AFA1-DC160CE0C43D}" type="slidenum">
+              <a:rPr lang="nb-NO" smtClean="0"/>
+              <a:t>17</a:t>
+            </a:fld>
+            <a:endParaRPr lang="nb-NO"/>
+          </a:p>
+        </p:txBody>
+      </p:sp>
+    </p:spTree>
+    <p:extLst>
+      <p:ext uri="{BB962C8B-B14F-4D97-AF65-F5344CB8AC3E}">
+        <p14:creationId xmlns:p14="http://schemas.microsoft.com/office/powerpoint/2010/main" val="157575892"/>
+      </p:ext>
+    </p:extLst>
+  </p:cSld>
+  <p:clrMapOvr>
+    <a:masterClrMapping/>
+  </p:clrMapOvr>
+</p:notes>
+</file>
+
+<file path=ppt/notesSlides/notesSlide8.xml><?xml version="1.0" encoding="utf-8"?>
+<p:notes xmlns:a="http://schemas.openxmlformats.org/drawingml/2006/main" xmlns:r="http://schemas.openxmlformats.org/officeDocument/2006/relationships" xmlns:p="http://schemas.openxmlformats.org/presentationml/2006/main">
+  <p:cSld>
+    <p:spTree>
+      <p:nvGrpSpPr>
+        <p:cNvPr id="1" name=""/>
+        <p:cNvGrpSpPr/>
+        <p:nvPr/>
+      </p:nvGrpSpPr>
+      <p:grpSpPr>
+        <a:xfrm>
+          <a:off x="0" y="0"/>
+          <a:ext cx="0" cy="0"/>
+          <a:chOff x="0" y="0"/>
+          <a:chExt cx="0" cy="0"/>
+        </a:xfrm>
+      </p:grpSpPr>
+      <p:sp>
+        <p:nvSpPr>
+          <p:cNvPr id="2" name="Plassholder for lysbilde 1"/>
+          <p:cNvSpPr>
+            <a:spLocks noGrp="1" noRot="1" noChangeAspect="1"/>
+          </p:cNvSpPr>
+          <p:nvPr>
+            <p:ph type="sldImg"/>
+          </p:nvPr>
+        </p:nvSpPr>
+        <p:spPr/>
+      </p:sp>
+      <p:sp>
+        <p:nvSpPr>
+          <p:cNvPr id="3" name="Plassholder for notater 2"/>
+          <p:cNvSpPr>
+            <a:spLocks noGrp="1"/>
+          </p:cNvSpPr>
+          <p:nvPr>
+            <p:ph type="body" idx="1"/>
+          </p:nvPr>
+        </p:nvSpPr>
+        <p:spPr/>
+        <p:txBody>
+          <a:bodyPr/>
+          <a:lstStyle/>
+          <a:p>
+            <a:endParaRPr lang="nb-NO" dirty="0"/>
+          </a:p>
+        </p:txBody>
+      </p:sp>
+      <p:sp>
+        <p:nvSpPr>
+          <p:cNvPr id="4" name="Plassholder for lysbildenummer 3"/>
+          <p:cNvSpPr>
+            <a:spLocks noGrp="1"/>
+          </p:cNvSpPr>
+          <p:nvPr>
+            <p:ph type="sldNum" sz="quarter" idx="5"/>
+          </p:nvPr>
+        </p:nvSpPr>
+        <p:spPr/>
+        <p:txBody>
+          <a:bodyPr/>
+          <a:lstStyle/>
+          <a:p>
+            <a:fld id="{D95B9550-F2AC-4E79-AFA1-DC160CE0C43D}" type="slidenum">
+              <a:rPr lang="nb-NO" smtClean="0"/>
+              <a:t>18</a:t>
+            </a:fld>
+            <a:endParaRPr lang="nb-NO"/>
+          </a:p>
+        </p:txBody>
+      </p:sp>
+    </p:spTree>
+    <p:extLst>
+      <p:ext uri="{BB962C8B-B14F-4D97-AF65-F5344CB8AC3E}">
+        <p14:creationId xmlns:p14="http://schemas.microsoft.com/office/powerpoint/2010/main" val="796502633"/>
+      </p:ext>
+    </p:extLst>
+  </p:cSld>
+  <p:clrMapOvr>
+    <a:masterClrMapping/>
+  </p:clrMapOvr>
+</p:notes>
+</file>
+
+<file path=ppt/notesSlides/notesSlide9.xml><?xml version="1.0" encoding="utf-8"?>
+<p:notes xmlns:a="http://schemas.openxmlformats.org/drawingml/2006/main" xmlns:r="http://schemas.openxmlformats.org/officeDocument/2006/relationships" xmlns:p="http://schemas.openxmlformats.org/presentationml/2006/main">
+  <p:cSld>
+    <p:spTree>
+      <p:nvGrpSpPr>
+        <p:cNvPr id="1" name=""/>
+        <p:cNvGrpSpPr/>
+        <p:nvPr/>
+      </p:nvGrpSpPr>
+      <p:grpSpPr>
+        <a:xfrm>
+          <a:off x="0" y="0"/>
+          <a:ext cx="0" cy="0"/>
+          <a:chOff x="0" y="0"/>
+          <a:chExt cx="0" cy="0"/>
+        </a:xfrm>
+      </p:grpSpPr>
+      <p:sp>
+        <p:nvSpPr>
+          <p:cNvPr id="2" name="Plassholder for lysbilde 1"/>
+          <p:cNvSpPr>
+            <a:spLocks noGrp="1" noRot="1" noChangeAspect="1"/>
+          </p:cNvSpPr>
+          <p:nvPr>
+            <p:ph type="sldImg"/>
+          </p:nvPr>
+        </p:nvSpPr>
+        <p:spPr/>
+      </p:sp>
+      <p:sp>
+        <p:nvSpPr>
+          <p:cNvPr id="3" name="Plassholder for notater 2"/>
+          <p:cNvSpPr>
+            <a:spLocks noGrp="1"/>
+          </p:cNvSpPr>
+          <p:nvPr>
+            <p:ph type="body" idx="1"/>
+          </p:nvPr>
+        </p:nvSpPr>
+        <p:spPr/>
+        <p:txBody>
+          <a:bodyPr/>
+          <a:lstStyle/>
+          <a:p>
+            <a:endParaRPr lang="nb-NO" dirty="0"/>
+          </a:p>
+        </p:txBody>
+      </p:sp>
+      <p:sp>
+        <p:nvSpPr>
+          <p:cNvPr id="4" name="Plassholder for lysbildenummer 3"/>
+          <p:cNvSpPr>
+            <a:spLocks noGrp="1"/>
+          </p:cNvSpPr>
+          <p:nvPr>
+            <p:ph type="sldNum" sz="quarter" idx="5"/>
+          </p:nvPr>
+        </p:nvSpPr>
+        <p:spPr/>
+        <p:txBody>
+          <a:bodyPr/>
+          <a:lstStyle/>
+          <a:p>
+            <a:fld id="{D95B9550-F2AC-4E79-AFA1-DC160CE0C43D}" type="slidenum">
+              <a:rPr lang="nb-NO" smtClean="0"/>
+              <a:t>19</a:t>
+            </a:fld>
+            <a:endParaRPr lang="nb-NO"/>
+          </a:p>
+        </p:txBody>
+      </p:sp>
+    </p:spTree>
+    <p:extLst>
+      <p:ext uri="{BB962C8B-B14F-4D97-AF65-F5344CB8AC3E}">
+        <p14:creationId xmlns:p14="http://schemas.microsoft.com/office/powerpoint/2010/main" val="980987763"/>
       </p:ext>
     </p:extLst>
   </p:cSld>
@@ -10648,22 +11501,17 @@
               </a:rPr>
               <a:t>False</a:t>
             </a:r>
+          </a:p>
+          <a:p>
+            <a:pPr marL="0" indent="0">
+              <a:buNone/>
+            </a:pPr>
             <a:endParaRPr lang="nb-NO" dirty="0">
               <a:solidFill>
-                <a:schemeClr val="accent4">
-                  <a:lumMod val="60000"/>
-                  <a:lumOff val="40000"/>
-                </a:schemeClr>
+                <a:srgbClr val="C44026"/>
               </a:solidFill>
+              <a:latin typeface="Consolas" panose="020B0609020204030204" pitchFamily="49" charset="0"/>
             </a:endParaRPr>
-          </a:p>
-          <a:p>
-            <a:pPr lvl="1"/>
-            <a:endParaRPr lang="nb-NO" dirty="0"/>
-          </a:p>
-          <a:p>
-            <a:pPr lvl="1"/>
-            <a:endParaRPr lang="nb-NO" dirty="0"/>
           </a:p>
         </p:txBody>
       </p:sp>
@@ -10762,7 +11610,7 @@
           <a:p>
             <a:r>
               <a:rPr lang="nb-NO" dirty="0"/>
-              <a:t>Prøv selv</a:t>
+              <a:t>Egendefinerte funksjoner</a:t>
             </a:r>
           </a:p>
         </p:txBody>
@@ -10785,31 +11633,192 @@
         </p:nvSpPr>
         <p:spPr>
           <a:xfrm>
-            <a:off x="762000" y="2411952"/>
-            <a:ext cx="10515600" cy="3003328"/>
+            <a:off x="838200" y="1572705"/>
+            <a:ext cx="11130280" cy="4370895"/>
           </a:xfrm>
         </p:spPr>
         <p:txBody>
           <a:bodyPr>
-            <a:normAutofit lnSpcReduction="10000"/>
+            <a:normAutofit/>
           </a:bodyPr>
           <a:lstStyle/>
           <a:p>
-            <a:pPr marL="0" indent="0" algn="ctr">
+            <a:pPr marL="0" indent="0">
               <a:buNone/>
             </a:pPr>
             <a:r>
-              <a:rPr lang="nb-NO" sz="4400" dirty="0">
-                <a:latin typeface="Consolas" panose="020B0609020204030204" pitchFamily="49" charset="0"/>
-              </a:rPr>
-              <a:t>uia-mn.github.io/workshop</a:t>
+              <a:rPr lang="nb-NO" dirty="0" err="1">
+                <a:solidFill>
+                  <a:srgbClr val="C44026"/>
+                </a:solidFill>
+                <a:latin typeface="Consolas" panose="020B0609020204030204" pitchFamily="49" charset="0"/>
+              </a:rPr>
+              <a:t>def</a:t>
+            </a:r>
+            <a:r>
+              <a:rPr lang="nb-NO" dirty="0">
+                <a:latin typeface="Consolas" panose="020B0609020204030204" pitchFamily="49" charset="0"/>
+              </a:rPr>
+              <a:t> </a:t>
+            </a:r>
+            <a:r>
+              <a:rPr lang="nb-NO" dirty="0" err="1">
+                <a:solidFill>
+                  <a:srgbClr val="9751CB"/>
+                </a:solidFill>
+                <a:latin typeface="Consolas" panose="020B0609020204030204" pitchFamily="49" charset="0"/>
+              </a:rPr>
+              <a:t>ErDeleligMedTo</a:t>
+            </a:r>
+            <a:r>
+              <a:rPr lang="nb-NO" dirty="0">
+                <a:latin typeface="Consolas" panose="020B0609020204030204" pitchFamily="49" charset="0"/>
+              </a:rPr>
+              <a:t>(rundenummer):</a:t>
             </a:r>
           </a:p>
           <a:p>
             <a:pPr marL="0" indent="0">
               <a:buNone/>
             </a:pPr>
-            <a:endParaRPr lang="nb-NO" sz="4000" dirty="0">
+            <a:r>
+              <a:rPr lang="nb-NO" dirty="0">
+                <a:latin typeface="Consolas" panose="020B0609020204030204" pitchFamily="49" charset="0"/>
+              </a:rPr>
+              <a:t>	</a:t>
+            </a:r>
+            <a:r>
+              <a:rPr lang="nb-NO" dirty="0" err="1">
+                <a:solidFill>
+                  <a:srgbClr val="C44026"/>
+                </a:solidFill>
+                <a:latin typeface="Consolas" panose="020B0609020204030204" pitchFamily="49" charset="0"/>
+              </a:rPr>
+              <a:t>if</a:t>
+            </a:r>
+            <a:r>
+              <a:rPr lang="nb-NO" dirty="0">
+                <a:latin typeface="Consolas" panose="020B0609020204030204" pitchFamily="49" charset="0"/>
+              </a:rPr>
+              <a:t> rundenummer % 2 == 0:</a:t>
+            </a:r>
+          </a:p>
+          <a:p>
+            <a:pPr marL="0" indent="0">
+              <a:buNone/>
+            </a:pPr>
+            <a:r>
+              <a:rPr lang="nb-NO" dirty="0">
+                <a:latin typeface="Consolas" panose="020B0609020204030204" pitchFamily="49" charset="0"/>
+              </a:rPr>
+              <a:t>		</a:t>
+            </a:r>
+            <a:r>
+              <a:rPr lang="nb-NO" dirty="0" err="1">
+                <a:solidFill>
+                  <a:srgbClr val="C44026"/>
+                </a:solidFill>
+                <a:latin typeface="Consolas" panose="020B0609020204030204" pitchFamily="49" charset="0"/>
+              </a:rPr>
+              <a:t>return</a:t>
+            </a:r>
+            <a:r>
+              <a:rPr lang="nb-NO" dirty="0">
+                <a:latin typeface="Consolas" panose="020B0609020204030204" pitchFamily="49" charset="0"/>
+              </a:rPr>
+              <a:t> </a:t>
+            </a:r>
+            <a:r>
+              <a:rPr lang="nb-NO" dirty="0">
+                <a:solidFill>
+                  <a:schemeClr val="accent4">
+                    <a:lumMod val="60000"/>
+                    <a:lumOff val="40000"/>
+                  </a:schemeClr>
+                </a:solidFill>
+                <a:latin typeface="Consolas" panose="020B0609020204030204" pitchFamily="49" charset="0"/>
+              </a:rPr>
+              <a:t>True</a:t>
+            </a:r>
+          </a:p>
+          <a:p>
+            <a:pPr marL="0" indent="0">
+              <a:buNone/>
+            </a:pPr>
+            <a:r>
+              <a:rPr lang="nb-NO" dirty="0">
+                <a:latin typeface="Consolas" panose="020B0609020204030204" pitchFamily="49" charset="0"/>
+              </a:rPr>
+              <a:t>	</a:t>
+            </a:r>
+            <a:r>
+              <a:rPr lang="nb-NO" dirty="0" err="1">
+                <a:solidFill>
+                  <a:srgbClr val="C44026"/>
+                </a:solidFill>
+                <a:latin typeface="Consolas" panose="020B0609020204030204" pitchFamily="49" charset="0"/>
+              </a:rPr>
+              <a:t>else</a:t>
+            </a:r>
+            <a:r>
+              <a:rPr lang="nb-NO" dirty="0">
+                <a:latin typeface="Consolas" panose="020B0609020204030204" pitchFamily="49" charset="0"/>
+              </a:rPr>
+              <a:t>:</a:t>
+            </a:r>
+          </a:p>
+          <a:p>
+            <a:pPr marL="0" indent="0">
+              <a:buNone/>
+            </a:pPr>
+            <a:r>
+              <a:rPr lang="nb-NO" dirty="0">
+                <a:solidFill>
+                  <a:srgbClr val="C44026"/>
+                </a:solidFill>
+                <a:latin typeface="Consolas" panose="020B0609020204030204" pitchFamily="49" charset="0"/>
+              </a:rPr>
+              <a:t>		</a:t>
+            </a:r>
+            <a:r>
+              <a:rPr lang="nb-NO" dirty="0" err="1">
+                <a:solidFill>
+                  <a:srgbClr val="C44026"/>
+                </a:solidFill>
+                <a:latin typeface="Consolas" panose="020B0609020204030204" pitchFamily="49" charset="0"/>
+              </a:rPr>
+              <a:t>return</a:t>
+            </a:r>
+            <a:r>
+              <a:rPr lang="nb-NO" dirty="0">
+                <a:solidFill>
+                  <a:srgbClr val="C44026"/>
+                </a:solidFill>
+                <a:latin typeface="Consolas" panose="020B0609020204030204" pitchFamily="49" charset="0"/>
+              </a:rPr>
+              <a:t> </a:t>
+            </a:r>
+            <a:r>
+              <a:rPr lang="nb-NO" dirty="0">
+                <a:solidFill>
+                  <a:schemeClr val="accent4">
+                    <a:lumMod val="60000"/>
+                    <a:lumOff val="40000"/>
+                  </a:schemeClr>
+                </a:solidFill>
+                <a:latin typeface="Consolas" panose="020B0609020204030204" pitchFamily="49" charset="0"/>
+              </a:rPr>
+              <a:t>False</a:t>
+            </a:r>
+          </a:p>
+          <a:p>
+            <a:pPr marL="0" indent="0">
+              <a:buNone/>
+            </a:pPr>
+            <a:endParaRPr lang="nb-NO" dirty="0">
+              <a:solidFill>
+                <a:srgbClr val="C44026"/>
+              </a:solidFill>
               <a:latin typeface="Consolas" panose="020B0609020204030204" pitchFamily="49" charset="0"/>
             </a:endParaRPr>
           </a:p>
@@ -10818,34 +11827,66 @@
               <a:buNone/>
             </a:pPr>
             <a:r>
-              <a:rPr lang="nb-NO" sz="3200" dirty="0">
-                <a:latin typeface="Consolas" panose="020B0609020204030204" pitchFamily="49" charset="0"/>
-              </a:rPr>
-              <a:t>Til hver oppgave har vi valgt ut én eller to konsept som du skal bli kjent med. Klikk på lenken i oppgaven mer informasjon om hvordan den fungerer.</a:t>
-            </a:r>
-          </a:p>
-          <a:p>
-            <a:endParaRPr lang="nb-NO" sz="4000" dirty="0">
-              <a:latin typeface="Consolas" panose="020B0609020204030204" pitchFamily="49" charset="0"/>
-            </a:endParaRPr>
+              <a:rPr lang="nb-NO" dirty="0" err="1">
+                <a:solidFill>
+                  <a:srgbClr val="C44026"/>
+                </a:solidFill>
+                <a:latin typeface="Consolas" panose="020B0609020204030204" pitchFamily="49" charset="0"/>
+              </a:rPr>
+              <a:t>def</a:t>
+            </a:r>
+            <a:r>
+              <a:rPr lang="nb-NO" dirty="0">
+                <a:latin typeface="Consolas" panose="020B0609020204030204" pitchFamily="49" charset="0"/>
+              </a:rPr>
+              <a:t> </a:t>
+            </a:r>
+            <a:r>
+              <a:rPr lang="nb-NO" dirty="0" err="1">
+                <a:solidFill>
+                  <a:srgbClr val="9751CB"/>
+                </a:solidFill>
+                <a:latin typeface="Consolas" panose="020B0609020204030204" pitchFamily="49" charset="0"/>
+              </a:rPr>
+              <a:t>ErDeleligMedTo</a:t>
+            </a:r>
+            <a:r>
+              <a:rPr lang="nb-NO" dirty="0">
+                <a:latin typeface="Consolas" panose="020B0609020204030204" pitchFamily="49" charset="0"/>
+              </a:rPr>
+              <a:t>(rundenummer):</a:t>
+            </a:r>
+          </a:p>
+          <a:p>
+            <a:pPr marL="0" indent="0">
+              <a:buNone/>
+            </a:pPr>
+            <a:r>
+              <a:rPr lang="nb-NO" dirty="0">
+                <a:latin typeface="Consolas" panose="020B0609020204030204" pitchFamily="49" charset="0"/>
+              </a:rPr>
+              <a:t>	</a:t>
+            </a:r>
+            <a:r>
+              <a:rPr lang="nb-NO" dirty="0" err="1">
+                <a:solidFill>
+                  <a:srgbClr val="C44026"/>
+                </a:solidFill>
+                <a:latin typeface="Consolas" panose="020B0609020204030204" pitchFamily="49" charset="0"/>
+              </a:rPr>
+              <a:t>return</a:t>
+            </a:r>
+            <a:r>
+              <a:rPr lang="nb-NO" dirty="0">
+                <a:latin typeface="Consolas" panose="020B0609020204030204" pitchFamily="49" charset="0"/>
+              </a:rPr>
+              <a:t> rundenummer % 2 == 0</a:t>
+            </a:r>
+            <a:endParaRPr lang="nb-NO" dirty="0"/>
           </a:p>
           <a:p>
             <a:pPr lvl="1"/>
-            <a:endParaRPr lang="nb-NO" sz="3600" dirty="0">
-              <a:latin typeface="Consolas" panose="020B0609020204030204" pitchFamily="49" charset="0"/>
-            </a:endParaRPr>
-          </a:p>
-          <a:p>
-            <a:pPr lvl="1"/>
-            <a:endParaRPr lang="nb-NO" sz="3600" dirty="0">
-              <a:latin typeface="Consolas" panose="020B0609020204030204" pitchFamily="49" charset="0"/>
-            </a:endParaRPr>
-          </a:p>
-          <a:p>
-            <a:pPr lvl="1"/>
-            <a:endParaRPr lang="nb-NO" sz="3600" dirty="0">
-              <a:latin typeface="Consolas" panose="020B0609020204030204" pitchFamily="49" charset="0"/>
-            </a:endParaRPr>
+            <a:endParaRPr lang="nb-NO" dirty="0"/>
           </a:p>
         </p:txBody>
       </p:sp>
@@ -10854,7 +11895,7 @@
           <p:cNvPr id="5" name="Footer Placeholder 4">
             <a:extLst>
               <a:ext uri="{FF2B5EF4-FFF2-40B4-BE49-F238E27FC236}">
-                <a16:creationId xmlns:a16="http://schemas.microsoft.com/office/drawing/2014/main" id="{2D147248-02D2-4FB6-802E-640535C4B302}"/>
+                <a16:creationId xmlns:a16="http://schemas.microsoft.com/office/drawing/2014/main" id="{767B00C4-1DF5-40AA-B029-F4C3630E7C6A}"/>
               </a:ext>
             </a:extLst>
           </p:cNvPr>
@@ -10894,7 +11935,1632 @@
     </p:spTree>
     <p:extLst>
       <p:ext uri="{BB962C8B-B14F-4D97-AF65-F5344CB8AC3E}">
-        <p14:creationId xmlns:p14="http://schemas.microsoft.com/office/powerpoint/2010/main" val="2476041199"/>
+        <p14:creationId xmlns:p14="http://schemas.microsoft.com/office/powerpoint/2010/main" val="1856889016"/>
+      </p:ext>
+    </p:extLst>
+  </p:cSld>
+  <p:clrMapOvr>
+    <a:masterClrMapping/>
+  </p:clrMapOvr>
+</p:sld>
+</file>
+
+<file path=ppt/slides/slide14.xml><?xml version="1.0" encoding="utf-8"?>
+<p:sld xmlns:a="http://schemas.openxmlformats.org/drawingml/2006/main" xmlns:r="http://schemas.openxmlformats.org/officeDocument/2006/relationships" xmlns:p="http://schemas.openxmlformats.org/presentationml/2006/main">
+  <p:cSld>
+    <p:spTree>
+      <p:nvGrpSpPr>
+        <p:cNvPr id="1" name=""/>
+        <p:cNvGrpSpPr/>
+        <p:nvPr/>
+      </p:nvGrpSpPr>
+      <p:grpSpPr>
+        <a:xfrm>
+          <a:off x="0" y="0"/>
+          <a:ext cx="0" cy="0"/>
+          <a:chOff x="0" y="0"/>
+          <a:chExt cx="0" cy="0"/>
+        </a:xfrm>
+      </p:grpSpPr>
+      <p:sp>
+        <p:nvSpPr>
+          <p:cNvPr id="2" name="Tittel 1">
+            <a:extLst>
+              <a:ext uri="{FF2B5EF4-FFF2-40B4-BE49-F238E27FC236}">
+                <a16:creationId xmlns:a16="http://schemas.microsoft.com/office/drawing/2014/main" id="{C3E6477F-AED9-484F-9621-C53F564119B4}"/>
+              </a:ext>
+            </a:extLst>
+          </p:cNvPr>
+          <p:cNvSpPr>
+            <a:spLocks noGrp="1"/>
+          </p:cNvSpPr>
+          <p:nvPr>
+            <p:ph type="title"/>
+          </p:nvPr>
+        </p:nvSpPr>
+        <p:spPr/>
+        <p:txBody>
+          <a:bodyPr/>
+          <a:lstStyle/>
+          <a:p>
+            <a:r>
+              <a:rPr lang="nb-NO" dirty="0"/>
+              <a:t>Egendefinerte funksjoner</a:t>
+            </a:r>
+          </a:p>
+        </p:txBody>
+      </p:sp>
+      <p:sp>
+        <p:nvSpPr>
+          <p:cNvPr id="3" name="Plassholder for innhold 2">
+            <a:extLst>
+              <a:ext uri="{FF2B5EF4-FFF2-40B4-BE49-F238E27FC236}">
+                <a16:creationId xmlns:a16="http://schemas.microsoft.com/office/drawing/2014/main" id="{18166937-65B3-4DC8-BB43-63584E0D60E0}"/>
+              </a:ext>
+            </a:extLst>
+          </p:cNvPr>
+          <p:cNvSpPr>
+            <a:spLocks noGrp="1"/>
+          </p:cNvSpPr>
+          <p:nvPr>
+            <p:ph idx="4294967295"/>
+          </p:nvPr>
+        </p:nvSpPr>
+        <p:spPr>
+          <a:xfrm>
+            <a:off x="838200" y="1572705"/>
+            <a:ext cx="11130280" cy="4370895"/>
+          </a:xfrm>
+        </p:spPr>
+        <p:txBody>
+          <a:bodyPr>
+            <a:normAutofit/>
+          </a:bodyPr>
+          <a:lstStyle/>
+          <a:p>
+            <a:pPr marL="0" indent="0">
+              <a:buNone/>
+            </a:pPr>
+            <a:r>
+              <a:rPr lang="nb-NO" dirty="0" err="1">
+                <a:solidFill>
+                  <a:srgbClr val="C44026"/>
+                </a:solidFill>
+                <a:latin typeface="Consolas" panose="020B0609020204030204" pitchFamily="49" charset="0"/>
+              </a:rPr>
+              <a:t>def</a:t>
+            </a:r>
+            <a:r>
+              <a:rPr lang="nb-NO" dirty="0">
+                <a:latin typeface="Consolas" panose="020B0609020204030204" pitchFamily="49" charset="0"/>
+              </a:rPr>
+              <a:t> </a:t>
+            </a:r>
+            <a:r>
+              <a:rPr lang="nb-NO" dirty="0" err="1">
+                <a:solidFill>
+                  <a:srgbClr val="9751CB"/>
+                </a:solidFill>
+                <a:latin typeface="Consolas" panose="020B0609020204030204" pitchFamily="49" charset="0"/>
+              </a:rPr>
+              <a:t>ErDeleligMedTo</a:t>
+            </a:r>
+            <a:r>
+              <a:rPr lang="nb-NO" dirty="0">
+                <a:latin typeface="Consolas" panose="020B0609020204030204" pitchFamily="49" charset="0"/>
+              </a:rPr>
+              <a:t>(rundenummer):</a:t>
+            </a:r>
+          </a:p>
+          <a:p>
+            <a:pPr marL="0" indent="0">
+              <a:buNone/>
+            </a:pPr>
+            <a:r>
+              <a:rPr lang="nb-NO" dirty="0">
+                <a:latin typeface="Consolas" panose="020B0609020204030204" pitchFamily="49" charset="0"/>
+              </a:rPr>
+              <a:t>	</a:t>
+            </a:r>
+            <a:r>
+              <a:rPr lang="nb-NO" dirty="0" err="1">
+                <a:solidFill>
+                  <a:srgbClr val="C44026"/>
+                </a:solidFill>
+                <a:latin typeface="Consolas" panose="020B0609020204030204" pitchFamily="49" charset="0"/>
+              </a:rPr>
+              <a:t>return</a:t>
+            </a:r>
+            <a:r>
+              <a:rPr lang="nb-NO" dirty="0">
+                <a:latin typeface="Consolas" panose="020B0609020204030204" pitchFamily="49" charset="0"/>
+              </a:rPr>
+              <a:t> rundenummer % 2 == 0</a:t>
+            </a:r>
+          </a:p>
+          <a:p>
+            <a:pPr marL="0" indent="0">
+              <a:buNone/>
+            </a:pPr>
+            <a:endParaRPr lang="nb-NO" dirty="0">
+              <a:latin typeface="Consolas" panose="020B0609020204030204" pitchFamily="49" charset="0"/>
+            </a:endParaRPr>
+          </a:p>
+          <a:p>
+            <a:pPr marL="0" indent="0">
+              <a:buNone/>
+            </a:pPr>
+            <a:endParaRPr lang="nb-NO" dirty="0"/>
+          </a:p>
+        </p:txBody>
+      </p:sp>
+      <p:sp>
+        <p:nvSpPr>
+          <p:cNvPr id="5" name="Footer Placeholder 4">
+            <a:extLst>
+              <a:ext uri="{FF2B5EF4-FFF2-40B4-BE49-F238E27FC236}">
+                <a16:creationId xmlns:a16="http://schemas.microsoft.com/office/drawing/2014/main" id="{767B00C4-1DF5-40AA-B029-F4C3630E7C6A}"/>
+              </a:ext>
+            </a:extLst>
+          </p:cNvPr>
+          <p:cNvSpPr>
+            <a:spLocks noGrp="1"/>
+          </p:cNvSpPr>
+          <p:nvPr>
+            <p:ph type="ftr" sz="quarter" idx="11"/>
+          </p:nvPr>
+        </p:nvSpPr>
+        <p:spPr>
+          <a:xfrm>
+            <a:off x="6937075" y="6310312"/>
+            <a:ext cx="4114800" cy="365125"/>
+          </a:xfrm>
+        </p:spPr>
+        <p:txBody>
+          <a:bodyPr/>
+          <a:lstStyle/>
+          <a:p>
+            <a:pPr>
+              <a:spcAft>
+                <a:spcPts val="600"/>
+              </a:spcAft>
+            </a:pPr>
+            <a:r>
+              <a:rPr lang="nb-NO" dirty="0">
+                <a:solidFill>
+                  <a:schemeClr val="tx1"/>
+                </a:solidFill>
+              </a:rPr>
+              <a:t>Henrik Njølstad &amp; André Martiny</a:t>
+            </a:r>
+          </a:p>
+        </p:txBody>
+      </p:sp>
+      <p:pic>
+        <p:nvPicPr>
+          <p:cNvPr id="2050" name="Picture 2">
+            <a:extLst>
+              <a:ext uri="{FF2B5EF4-FFF2-40B4-BE49-F238E27FC236}">
+                <a16:creationId xmlns:a16="http://schemas.microsoft.com/office/drawing/2014/main" id="{497BAC9D-3202-437C-B12B-E3164F1AB1E7}"/>
+              </a:ext>
+            </a:extLst>
+          </p:cNvPr>
+          <p:cNvPicPr>
+            <a:picLocks noChangeAspect="1" noChangeArrowheads="1"/>
+          </p:cNvPicPr>
+          <p:nvPr/>
+        </p:nvPicPr>
+        <p:blipFill>
+          <a:blip r:embed="rId3">
+            <a:extLst>
+              <a:ext uri="{28A0092B-C50C-407E-A947-70E740481C1C}">
+                <a14:useLocalDpi xmlns:a14="http://schemas.microsoft.com/office/drawing/2010/main" val="0"/>
+              </a:ext>
+            </a:extLst>
+          </a:blip>
+          <a:srcRect/>
+          <a:stretch>
+            <a:fillRect/>
+          </a:stretch>
+        </p:blipFill>
+        <p:spPr bwMode="auto">
+          <a:xfrm>
+            <a:off x="8613475" y="1679068"/>
+            <a:ext cx="2438400" cy="2438400"/>
+          </a:xfrm>
+          <a:prstGeom prst="rect">
+            <a:avLst/>
+          </a:prstGeom>
+          <a:noFill/>
+          <a:extLst>
+            <a:ext uri="{909E8E84-426E-40DD-AFC4-6F175D3DCCD1}">
+              <a14:hiddenFill xmlns:a14="http://schemas.microsoft.com/office/drawing/2010/main">
+                <a:solidFill>
+                  <a:srgbClr val="FFFFFF"/>
+                </a:solidFill>
+              </a14:hiddenFill>
+            </a:ext>
+          </a:extLst>
+        </p:spPr>
+      </p:pic>
+    </p:spTree>
+    <p:extLst>
+      <p:ext uri="{BB962C8B-B14F-4D97-AF65-F5344CB8AC3E}">
+        <p14:creationId xmlns:p14="http://schemas.microsoft.com/office/powerpoint/2010/main" val="59968565"/>
+      </p:ext>
+    </p:extLst>
+  </p:cSld>
+  <p:clrMapOvr>
+    <a:masterClrMapping/>
+  </p:clrMapOvr>
+</p:sld>
+</file>
+
+<file path=ppt/slides/slide15.xml><?xml version="1.0" encoding="utf-8"?>
+<p:sld xmlns:a="http://schemas.openxmlformats.org/drawingml/2006/main" xmlns:r="http://schemas.openxmlformats.org/officeDocument/2006/relationships" xmlns:p="http://schemas.openxmlformats.org/presentationml/2006/main">
+  <p:cSld>
+    <p:spTree>
+      <p:nvGrpSpPr>
+        <p:cNvPr id="1" name=""/>
+        <p:cNvGrpSpPr/>
+        <p:nvPr/>
+      </p:nvGrpSpPr>
+      <p:grpSpPr>
+        <a:xfrm>
+          <a:off x="0" y="0"/>
+          <a:ext cx="0" cy="0"/>
+          <a:chOff x="0" y="0"/>
+          <a:chExt cx="0" cy="0"/>
+        </a:xfrm>
+      </p:grpSpPr>
+      <p:sp>
+        <p:nvSpPr>
+          <p:cNvPr id="2" name="Tittel 1">
+            <a:extLst>
+              <a:ext uri="{FF2B5EF4-FFF2-40B4-BE49-F238E27FC236}">
+                <a16:creationId xmlns:a16="http://schemas.microsoft.com/office/drawing/2014/main" id="{C3E6477F-AED9-484F-9621-C53F564119B4}"/>
+              </a:ext>
+            </a:extLst>
+          </p:cNvPr>
+          <p:cNvSpPr>
+            <a:spLocks noGrp="1"/>
+          </p:cNvSpPr>
+          <p:nvPr>
+            <p:ph type="title"/>
+          </p:nvPr>
+        </p:nvSpPr>
+        <p:spPr/>
+        <p:txBody>
+          <a:bodyPr/>
+          <a:lstStyle/>
+          <a:p>
+            <a:r>
+              <a:rPr lang="nb-NO" dirty="0"/>
+              <a:t>Egendefinerte funksjoner</a:t>
+            </a:r>
+          </a:p>
+        </p:txBody>
+      </p:sp>
+      <p:sp>
+        <p:nvSpPr>
+          <p:cNvPr id="3" name="Plassholder for innhold 2">
+            <a:extLst>
+              <a:ext uri="{FF2B5EF4-FFF2-40B4-BE49-F238E27FC236}">
+                <a16:creationId xmlns:a16="http://schemas.microsoft.com/office/drawing/2014/main" id="{18166937-65B3-4DC8-BB43-63584E0D60E0}"/>
+              </a:ext>
+            </a:extLst>
+          </p:cNvPr>
+          <p:cNvSpPr>
+            <a:spLocks noGrp="1"/>
+          </p:cNvSpPr>
+          <p:nvPr>
+            <p:ph idx="4294967295"/>
+          </p:nvPr>
+        </p:nvSpPr>
+        <p:spPr>
+          <a:xfrm>
+            <a:off x="838200" y="1572705"/>
+            <a:ext cx="11130280" cy="4370895"/>
+          </a:xfrm>
+        </p:spPr>
+        <p:txBody>
+          <a:bodyPr>
+            <a:normAutofit/>
+          </a:bodyPr>
+          <a:lstStyle/>
+          <a:p>
+            <a:pPr marL="0" indent="0">
+              <a:buNone/>
+            </a:pPr>
+            <a:r>
+              <a:rPr lang="nb-NO" dirty="0" err="1">
+                <a:solidFill>
+                  <a:srgbClr val="C44026"/>
+                </a:solidFill>
+                <a:latin typeface="Consolas" panose="020B0609020204030204" pitchFamily="49" charset="0"/>
+              </a:rPr>
+              <a:t>def</a:t>
+            </a:r>
+            <a:r>
+              <a:rPr lang="nb-NO" dirty="0">
+                <a:latin typeface="Consolas" panose="020B0609020204030204" pitchFamily="49" charset="0"/>
+              </a:rPr>
+              <a:t> </a:t>
+            </a:r>
+            <a:r>
+              <a:rPr lang="nb-NO" dirty="0" err="1">
+                <a:solidFill>
+                  <a:srgbClr val="9751CB"/>
+                </a:solidFill>
+                <a:latin typeface="Consolas" panose="020B0609020204030204" pitchFamily="49" charset="0"/>
+              </a:rPr>
+              <a:t>ErDeleligMedTo</a:t>
+            </a:r>
+            <a:r>
+              <a:rPr lang="nb-NO" dirty="0">
+                <a:latin typeface="Consolas" panose="020B0609020204030204" pitchFamily="49" charset="0"/>
+              </a:rPr>
+              <a:t>(rundenummer):</a:t>
+            </a:r>
+          </a:p>
+          <a:p>
+            <a:pPr marL="0" indent="0">
+              <a:buNone/>
+            </a:pPr>
+            <a:r>
+              <a:rPr lang="nb-NO" dirty="0">
+                <a:latin typeface="Consolas" panose="020B0609020204030204" pitchFamily="49" charset="0"/>
+              </a:rPr>
+              <a:t>	</a:t>
+            </a:r>
+            <a:r>
+              <a:rPr lang="nb-NO" dirty="0" err="1">
+                <a:solidFill>
+                  <a:srgbClr val="C44026"/>
+                </a:solidFill>
+                <a:latin typeface="Consolas" panose="020B0609020204030204" pitchFamily="49" charset="0"/>
+              </a:rPr>
+              <a:t>return</a:t>
+            </a:r>
+            <a:r>
+              <a:rPr lang="nb-NO" dirty="0">
+                <a:latin typeface="Consolas" panose="020B0609020204030204" pitchFamily="49" charset="0"/>
+              </a:rPr>
+              <a:t> rundenummer % 2 == 0</a:t>
+            </a:r>
+          </a:p>
+          <a:p>
+            <a:pPr marL="0" indent="0">
+              <a:buNone/>
+            </a:pPr>
+            <a:endParaRPr lang="nb-NO" dirty="0">
+              <a:latin typeface="Consolas" panose="020B0609020204030204" pitchFamily="49" charset="0"/>
+            </a:endParaRPr>
+          </a:p>
+          <a:p>
+            <a:pPr marL="0" indent="0">
+              <a:buNone/>
+            </a:pPr>
+            <a:r>
+              <a:rPr lang="nb-NO" dirty="0">
+                <a:latin typeface="Consolas" panose="020B0609020204030204" pitchFamily="49" charset="0"/>
+              </a:rPr>
+              <a:t>&gt;&gt;&gt; </a:t>
+            </a:r>
+            <a:r>
+              <a:rPr lang="nb-NO" dirty="0" err="1">
+                <a:latin typeface="Consolas" panose="020B0609020204030204" pitchFamily="49" charset="0"/>
+              </a:rPr>
+              <a:t>ErDeleligMedTo</a:t>
+            </a:r>
+            <a:r>
+              <a:rPr lang="nb-NO" dirty="0">
+                <a:latin typeface="Consolas" panose="020B0609020204030204" pitchFamily="49" charset="0"/>
+              </a:rPr>
+              <a:t>(4)</a:t>
+            </a:r>
+          </a:p>
+          <a:p>
+            <a:pPr marL="0" indent="0">
+              <a:buNone/>
+            </a:pPr>
+            <a:endParaRPr lang="nb-NO" dirty="0">
+              <a:latin typeface="Consolas" panose="020B0609020204030204" pitchFamily="49" charset="0"/>
+            </a:endParaRPr>
+          </a:p>
+          <a:p>
+            <a:pPr marL="0" indent="0">
+              <a:buNone/>
+            </a:pPr>
+            <a:endParaRPr lang="nb-NO" dirty="0"/>
+          </a:p>
+        </p:txBody>
+      </p:sp>
+      <p:sp>
+        <p:nvSpPr>
+          <p:cNvPr id="5" name="Footer Placeholder 4">
+            <a:extLst>
+              <a:ext uri="{FF2B5EF4-FFF2-40B4-BE49-F238E27FC236}">
+                <a16:creationId xmlns:a16="http://schemas.microsoft.com/office/drawing/2014/main" id="{767B00C4-1DF5-40AA-B029-F4C3630E7C6A}"/>
+              </a:ext>
+            </a:extLst>
+          </p:cNvPr>
+          <p:cNvSpPr>
+            <a:spLocks noGrp="1"/>
+          </p:cNvSpPr>
+          <p:nvPr>
+            <p:ph type="ftr" sz="quarter" idx="11"/>
+          </p:nvPr>
+        </p:nvSpPr>
+        <p:spPr>
+          <a:xfrm>
+            <a:off x="6937075" y="6310312"/>
+            <a:ext cx="4114800" cy="365125"/>
+          </a:xfrm>
+        </p:spPr>
+        <p:txBody>
+          <a:bodyPr/>
+          <a:lstStyle/>
+          <a:p>
+            <a:pPr>
+              <a:spcAft>
+                <a:spcPts val="600"/>
+              </a:spcAft>
+            </a:pPr>
+            <a:r>
+              <a:rPr lang="nb-NO" dirty="0">
+                <a:solidFill>
+                  <a:schemeClr val="tx1"/>
+                </a:solidFill>
+              </a:rPr>
+              <a:t>Henrik Njølstad &amp; André Martiny</a:t>
+            </a:r>
+          </a:p>
+        </p:txBody>
+      </p:sp>
+      <p:pic>
+        <p:nvPicPr>
+          <p:cNvPr id="2050" name="Picture 2">
+            <a:extLst>
+              <a:ext uri="{FF2B5EF4-FFF2-40B4-BE49-F238E27FC236}">
+                <a16:creationId xmlns:a16="http://schemas.microsoft.com/office/drawing/2014/main" id="{497BAC9D-3202-437C-B12B-E3164F1AB1E7}"/>
+              </a:ext>
+            </a:extLst>
+          </p:cNvPr>
+          <p:cNvPicPr>
+            <a:picLocks noChangeAspect="1" noChangeArrowheads="1"/>
+          </p:cNvPicPr>
+          <p:nvPr/>
+        </p:nvPicPr>
+        <p:blipFill>
+          <a:blip r:embed="rId3">
+            <a:extLst>
+              <a:ext uri="{28A0092B-C50C-407E-A947-70E740481C1C}">
+                <a14:useLocalDpi xmlns:a14="http://schemas.microsoft.com/office/drawing/2010/main" val="0"/>
+              </a:ext>
+            </a:extLst>
+          </a:blip>
+          <a:srcRect/>
+          <a:stretch>
+            <a:fillRect/>
+          </a:stretch>
+        </p:blipFill>
+        <p:spPr bwMode="auto">
+          <a:xfrm>
+            <a:off x="8613475" y="1679068"/>
+            <a:ext cx="2438400" cy="2438400"/>
+          </a:xfrm>
+          <a:prstGeom prst="rect">
+            <a:avLst/>
+          </a:prstGeom>
+          <a:noFill/>
+          <a:extLst>
+            <a:ext uri="{909E8E84-426E-40DD-AFC4-6F175D3DCCD1}">
+              <a14:hiddenFill xmlns:a14="http://schemas.microsoft.com/office/drawing/2010/main">
+                <a:solidFill>
+                  <a:srgbClr val="FFFFFF"/>
+                </a:solidFill>
+              </a14:hiddenFill>
+            </a:ext>
+          </a:extLst>
+        </p:spPr>
+      </p:pic>
+    </p:spTree>
+    <p:extLst>
+      <p:ext uri="{BB962C8B-B14F-4D97-AF65-F5344CB8AC3E}">
+        <p14:creationId xmlns:p14="http://schemas.microsoft.com/office/powerpoint/2010/main" val="1040056657"/>
+      </p:ext>
+    </p:extLst>
+  </p:cSld>
+  <p:clrMapOvr>
+    <a:masterClrMapping/>
+  </p:clrMapOvr>
+</p:sld>
+</file>
+
+<file path=ppt/slides/slide16.xml><?xml version="1.0" encoding="utf-8"?>
+<p:sld xmlns:a="http://schemas.openxmlformats.org/drawingml/2006/main" xmlns:r="http://schemas.openxmlformats.org/officeDocument/2006/relationships" xmlns:p="http://schemas.openxmlformats.org/presentationml/2006/main">
+  <p:cSld>
+    <p:spTree>
+      <p:nvGrpSpPr>
+        <p:cNvPr id="1" name=""/>
+        <p:cNvGrpSpPr/>
+        <p:nvPr/>
+      </p:nvGrpSpPr>
+      <p:grpSpPr>
+        <a:xfrm>
+          <a:off x="0" y="0"/>
+          <a:ext cx="0" cy="0"/>
+          <a:chOff x="0" y="0"/>
+          <a:chExt cx="0" cy="0"/>
+        </a:xfrm>
+      </p:grpSpPr>
+      <p:sp>
+        <p:nvSpPr>
+          <p:cNvPr id="2" name="Tittel 1">
+            <a:extLst>
+              <a:ext uri="{FF2B5EF4-FFF2-40B4-BE49-F238E27FC236}">
+                <a16:creationId xmlns:a16="http://schemas.microsoft.com/office/drawing/2014/main" id="{C3E6477F-AED9-484F-9621-C53F564119B4}"/>
+              </a:ext>
+            </a:extLst>
+          </p:cNvPr>
+          <p:cNvSpPr>
+            <a:spLocks noGrp="1"/>
+          </p:cNvSpPr>
+          <p:nvPr>
+            <p:ph type="title"/>
+          </p:nvPr>
+        </p:nvSpPr>
+        <p:spPr/>
+        <p:txBody>
+          <a:bodyPr/>
+          <a:lstStyle/>
+          <a:p>
+            <a:r>
+              <a:rPr lang="nb-NO" dirty="0"/>
+              <a:t>Egendefinerte funksjoner</a:t>
+            </a:r>
+          </a:p>
+        </p:txBody>
+      </p:sp>
+      <p:sp>
+        <p:nvSpPr>
+          <p:cNvPr id="3" name="Plassholder for innhold 2">
+            <a:extLst>
+              <a:ext uri="{FF2B5EF4-FFF2-40B4-BE49-F238E27FC236}">
+                <a16:creationId xmlns:a16="http://schemas.microsoft.com/office/drawing/2014/main" id="{18166937-65B3-4DC8-BB43-63584E0D60E0}"/>
+              </a:ext>
+            </a:extLst>
+          </p:cNvPr>
+          <p:cNvSpPr>
+            <a:spLocks noGrp="1"/>
+          </p:cNvSpPr>
+          <p:nvPr>
+            <p:ph idx="4294967295"/>
+          </p:nvPr>
+        </p:nvSpPr>
+        <p:spPr>
+          <a:xfrm>
+            <a:off x="838200" y="1572705"/>
+            <a:ext cx="11130280" cy="4370895"/>
+          </a:xfrm>
+        </p:spPr>
+        <p:txBody>
+          <a:bodyPr>
+            <a:normAutofit/>
+          </a:bodyPr>
+          <a:lstStyle/>
+          <a:p>
+            <a:pPr marL="0" indent="0">
+              <a:buNone/>
+            </a:pPr>
+            <a:r>
+              <a:rPr lang="nb-NO" dirty="0" err="1">
+                <a:solidFill>
+                  <a:srgbClr val="C44026"/>
+                </a:solidFill>
+                <a:latin typeface="Consolas" panose="020B0609020204030204" pitchFamily="49" charset="0"/>
+              </a:rPr>
+              <a:t>def</a:t>
+            </a:r>
+            <a:r>
+              <a:rPr lang="nb-NO" dirty="0">
+                <a:latin typeface="Consolas" panose="020B0609020204030204" pitchFamily="49" charset="0"/>
+              </a:rPr>
+              <a:t> </a:t>
+            </a:r>
+            <a:r>
+              <a:rPr lang="nb-NO" dirty="0" err="1">
+                <a:solidFill>
+                  <a:srgbClr val="9751CB"/>
+                </a:solidFill>
+                <a:latin typeface="Consolas" panose="020B0609020204030204" pitchFamily="49" charset="0"/>
+              </a:rPr>
+              <a:t>ErDeleligMedTo</a:t>
+            </a:r>
+            <a:r>
+              <a:rPr lang="nb-NO" dirty="0">
+                <a:latin typeface="Consolas" panose="020B0609020204030204" pitchFamily="49" charset="0"/>
+              </a:rPr>
+              <a:t>(rundenummer):</a:t>
+            </a:r>
+          </a:p>
+          <a:p>
+            <a:pPr marL="0" indent="0">
+              <a:buNone/>
+            </a:pPr>
+            <a:r>
+              <a:rPr lang="nb-NO" dirty="0">
+                <a:latin typeface="Consolas" panose="020B0609020204030204" pitchFamily="49" charset="0"/>
+              </a:rPr>
+              <a:t>	</a:t>
+            </a:r>
+            <a:r>
+              <a:rPr lang="nb-NO" dirty="0" err="1">
+                <a:solidFill>
+                  <a:srgbClr val="C44026"/>
+                </a:solidFill>
+                <a:latin typeface="Consolas" panose="020B0609020204030204" pitchFamily="49" charset="0"/>
+              </a:rPr>
+              <a:t>return</a:t>
+            </a:r>
+            <a:r>
+              <a:rPr lang="nb-NO" dirty="0">
+                <a:latin typeface="Consolas" panose="020B0609020204030204" pitchFamily="49" charset="0"/>
+              </a:rPr>
+              <a:t> rundenummer % 2 == 0</a:t>
+            </a:r>
+          </a:p>
+          <a:p>
+            <a:pPr marL="0" indent="0">
+              <a:buNone/>
+            </a:pPr>
+            <a:endParaRPr lang="nb-NO" dirty="0">
+              <a:latin typeface="Consolas" panose="020B0609020204030204" pitchFamily="49" charset="0"/>
+            </a:endParaRPr>
+          </a:p>
+          <a:p>
+            <a:pPr marL="0" indent="0">
+              <a:buNone/>
+            </a:pPr>
+            <a:r>
+              <a:rPr lang="nb-NO" dirty="0">
+                <a:latin typeface="Consolas" panose="020B0609020204030204" pitchFamily="49" charset="0"/>
+              </a:rPr>
+              <a:t>&gt;&gt;&gt; </a:t>
+            </a:r>
+            <a:r>
+              <a:rPr lang="nb-NO" dirty="0" err="1">
+                <a:latin typeface="Consolas" panose="020B0609020204030204" pitchFamily="49" charset="0"/>
+              </a:rPr>
+              <a:t>ErDeleligMedTo</a:t>
+            </a:r>
+            <a:r>
+              <a:rPr lang="nb-NO" dirty="0">
+                <a:latin typeface="Consolas" panose="020B0609020204030204" pitchFamily="49" charset="0"/>
+              </a:rPr>
+              <a:t>(4)</a:t>
+            </a:r>
+          </a:p>
+          <a:p>
+            <a:pPr marL="0" indent="0">
+              <a:buNone/>
+            </a:pPr>
+            <a:r>
+              <a:rPr lang="nb-NO" dirty="0">
+                <a:solidFill>
+                  <a:schemeClr val="accent4">
+                    <a:lumMod val="60000"/>
+                    <a:lumOff val="40000"/>
+                  </a:schemeClr>
+                </a:solidFill>
+                <a:latin typeface="Consolas" panose="020B0609020204030204" pitchFamily="49" charset="0"/>
+              </a:rPr>
+              <a:t>True</a:t>
+            </a:r>
+            <a:endParaRPr lang="nb-NO" dirty="0">
+              <a:latin typeface="Consolas" panose="020B0609020204030204" pitchFamily="49" charset="0"/>
+            </a:endParaRPr>
+          </a:p>
+          <a:p>
+            <a:pPr marL="0" indent="0">
+              <a:buNone/>
+            </a:pPr>
+            <a:endParaRPr lang="nb-NO" dirty="0"/>
+          </a:p>
+        </p:txBody>
+      </p:sp>
+      <p:sp>
+        <p:nvSpPr>
+          <p:cNvPr id="5" name="Footer Placeholder 4">
+            <a:extLst>
+              <a:ext uri="{FF2B5EF4-FFF2-40B4-BE49-F238E27FC236}">
+                <a16:creationId xmlns:a16="http://schemas.microsoft.com/office/drawing/2014/main" id="{767B00C4-1DF5-40AA-B029-F4C3630E7C6A}"/>
+              </a:ext>
+            </a:extLst>
+          </p:cNvPr>
+          <p:cNvSpPr>
+            <a:spLocks noGrp="1"/>
+          </p:cNvSpPr>
+          <p:nvPr>
+            <p:ph type="ftr" sz="quarter" idx="11"/>
+          </p:nvPr>
+        </p:nvSpPr>
+        <p:spPr>
+          <a:xfrm>
+            <a:off x="6937075" y="6310312"/>
+            <a:ext cx="4114800" cy="365125"/>
+          </a:xfrm>
+        </p:spPr>
+        <p:txBody>
+          <a:bodyPr/>
+          <a:lstStyle/>
+          <a:p>
+            <a:pPr>
+              <a:spcAft>
+                <a:spcPts val="600"/>
+              </a:spcAft>
+            </a:pPr>
+            <a:r>
+              <a:rPr lang="nb-NO" dirty="0">
+                <a:solidFill>
+                  <a:schemeClr val="tx1"/>
+                </a:solidFill>
+              </a:rPr>
+              <a:t>Henrik Njølstad &amp; André Martiny</a:t>
+            </a:r>
+          </a:p>
+        </p:txBody>
+      </p:sp>
+      <p:pic>
+        <p:nvPicPr>
+          <p:cNvPr id="2050" name="Picture 2">
+            <a:extLst>
+              <a:ext uri="{FF2B5EF4-FFF2-40B4-BE49-F238E27FC236}">
+                <a16:creationId xmlns:a16="http://schemas.microsoft.com/office/drawing/2014/main" id="{497BAC9D-3202-437C-B12B-E3164F1AB1E7}"/>
+              </a:ext>
+            </a:extLst>
+          </p:cNvPr>
+          <p:cNvPicPr>
+            <a:picLocks noChangeAspect="1" noChangeArrowheads="1"/>
+          </p:cNvPicPr>
+          <p:nvPr/>
+        </p:nvPicPr>
+        <p:blipFill>
+          <a:blip r:embed="rId3">
+            <a:extLst>
+              <a:ext uri="{28A0092B-C50C-407E-A947-70E740481C1C}">
+                <a14:useLocalDpi xmlns:a14="http://schemas.microsoft.com/office/drawing/2010/main" val="0"/>
+              </a:ext>
+            </a:extLst>
+          </a:blip>
+          <a:srcRect/>
+          <a:stretch>
+            <a:fillRect/>
+          </a:stretch>
+        </p:blipFill>
+        <p:spPr bwMode="auto">
+          <a:xfrm>
+            <a:off x="8613475" y="1679068"/>
+            <a:ext cx="2438400" cy="2438400"/>
+          </a:xfrm>
+          <a:prstGeom prst="rect">
+            <a:avLst/>
+          </a:prstGeom>
+          <a:noFill/>
+          <a:extLst>
+            <a:ext uri="{909E8E84-426E-40DD-AFC4-6F175D3DCCD1}">
+              <a14:hiddenFill xmlns:a14="http://schemas.microsoft.com/office/drawing/2010/main">
+                <a:solidFill>
+                  <a:srgbClr val="FFFFFF"/>
+                </a:solidFill>
+              </a14:hiddenFill>
+            </a:ext>
+          </a:extLst>
+        </p:spPr>
+      </p:pic>
+    </p:spTree>
+    <p:extLst>
+      <p:ext uri="{BB962C8B-B14F-4D97-AF65-F5344CB8AC3E}">
+        <p14:creationId xmlns:p14="http://schemas.microsoft.com/office/powerpoint/2010/main" val="3374629622"/>
+      </p:ext>
+    </p:extLst>
+  </p:cSld>
+  <p:clrMapOvr>
+    <a:masterClrMapping/>
+  </p:clrMapOvr>
+</p:sld>
+</file>
+
+<file path=ppt/slides/slide17.xml><?xml version="1.0" encoding="utf-8"?>
+<p:sld xmlns:a="http://schemas.openxmlformats.org/drawingml/2006/main" xmlns:r="http://schemas.openxmlformats.org/officeDocument/2006/relationships" xmlns:p="http://schemas.openxmlformats.org/presentationml/2006/main">
+  <p:cSld>
+    <p:spTree>
+      <p:nvGrpSpPr>
+        <p:cNvPr id="1" name=""/>
+        <p:cNvGrpSpPr/>
+        <p:nvPr/>
+      </p:nvGrpSpPr>
+      <p:grpSpPr>
+        <a:xfrm>
+          <a:off x="0" y="0"/>
+          <a:ext cx="0" cy="0"/>
+          <a:chOff x="0" y="0"/>
+          <a:chExt cx="0" cy="0"/>
+        </a:xfrm>
+      </p:grpSpPr>
+      <p:sp>
+        <p:nvSpPr>
+          <p:cNvPr id="2" name="Tittel 1">
+            <a:extLst>
+              <a:ext uri="{FF2B5EF4-FFF2-40B4-BE49-F238E27FC236}">
+                <a16:creationId xmlns:a16="http://schemas.microsoft.com/office/drawing/2014/main" id="{C3E6477F-AED9-484F-9621-C53F564119B4}"/>
+              </a:ext>
+            </a:extLst>
+          </p:cNvPr>
+          <p:cNvSpPr>
+            <a:spLocks noGrp="1"/>
+          </p:cNvSpPr>
+          <p:nvPr>
+            <p:ph type="title"/>
+          </p:nvPr>
+        </p:nvSpPr>
+        <p:spPr/>
+        <p:txBody>
+          <a:bodyPr/>
+          <a:lstStyle/>
+          <a:p>
+            <a:r>
+              <a:rPr lang="nb-NO" dirty="0"/>
+              <a:t>Egendefinerte funksjoner</a:t>
+            </a:r>
+          </a:p>
+        </p:txBody>
+      </p:sp>
+      <p:sp>
+        <p:nvSpPr>
+          <p:cNvPr id="3" name="Plassholder for innhold 2">
+            <a:extLst>
+              <a:ext uri="{FF2B5EF4-FFF2-40B4-BE49-F238E27FC236}">
+                <a16:creationId xmlns:a16="http://schemas.microsoft.com/office/drawing/2014/main" id="{18166937-65B3-4DC8-BB43-63584E0D60E0}"/>
+              </a:ext>
+            </a:extLst>
+          </p:cNvPr>
+          <p:cNvSpPr>
+            <a:spLocks noGrp="1"/>
+          </p:cNvSpPr>
+          <p:nvPr>
+            <p:ph idx="4294967295"/>
+          </p:nvPr>
+        </p:nvSpPr>
+        <p:spPr>
+          <a:xfrm>
+            <a:off x="838200" y="1572705"/>
+            <a:ext cx="11130280" cy="4370895"/>
+          </a:xfrm>
+        </p:spPr>
+        <p:txBody>
+          <a:bodyPr>
+            <a:normAutofit/>
+          </a:bodyPr>
+          <a:lstStyle/>
+          <a:p>
+            <a:pPr marL="0" indent="0">
+              <a:buNone/>
+            </a:pPr>
+            <a:r>
+              <a:rPr lang="nb-NO" dirty="0" err="1">
+                <a:solidFill>
+                  <a:srgbClr val="C44026"/>
+                </a:solidFill>
+                <a:latin typeface="Consolas" panose="020B0609020204030204" pitchFamily="49" charset="0"/>
+              </a:rPr>
+              <a:t>def</a:t>
+            </a:r>
+            <a:r>
+              <a:rPr lang="nb-NO" dirty="0">
+                <a:latin typeface="Consolas" panose="020B0609020204030204" pitchFamily="49" charset="0"/>
+              </a:rPr>
+              <a:t> </a:t>
+            </a:r>
+            <a:r>
+              <a:rPr lang="nb-NO" dirty="0" err="1">
+                <a:solidFill>
+                  <a:srgbClr val="9751CB"/>
+                </a:solidFill>
+                <a:latin typeface="Consolas" panose="020B0609020204030204" pitchFamily="49" charset="0"/>
+              </a:rPr>
+              <a:t>ErDeleligMedTo</a:t>
+            </a:r>
+            <a:r>
+              <a:rPr lang="nb-NO" dirty="0">
+                <a:latin typeface="Consolas" panose="020B0609020204030204" pitchFamily="49" charset="0"/>
+              </a:rPr>
+              <a:t>(rundenummer):</a:t>
+            </a:r>
+          </a:p>
+          <a:p>
+            <a:pPr marL="0" indent="0">
+              <a:buNone/>
+            </a:pPr>
+            <a:r>
+              <a:rPr lang="nb-NO" dirty="0">
+                <a:latin typeface="Consolas" panose="020B0609020204030204" pitchFamily="49" charset="0"/>
+              </a:rPr>
+              <a:t>	</a:t>
+            </a:r>
+            <a:r>
+              <a:rPr lang="nb-NO" dirty="0" err="1">
+                <a:solidFill>
+                  <a:srgbClr val="C44026"/>
+                </a:solidFill>
+                <a:latin typeface="Consolas" panose="020B0609020204030204" pitchFamily="49" charset="0"/>
+              </a:rPr>
+              <a:t>return</a:t>
+            </a:r>
+            <a:r>
+              <a:rPr lang="nb-NO" dirty="0">
+                <a:latin typeface="Consolas" panose="020B0609020204030204" pitchFamily="49" charset="0"/>
+              </a:rPr>
+              <a:t> rundenummer % 2 == 0</a:t>
+            </a:r>
+          </a:p>
+          <a:p>
+            <a:pPr marL="0" indent="0">
+              <a:buNone/>
+            </a:pPr>
+            <a:endParaRPr lang="nb-NO" dirty="0">
+              <a:latin typeface="Consolas" panose="020B0609020204030204" pitchFamily="49" charset="0"/>
+            </a:endParaRPr>
+          </a:p>
+          <a:p>
+            <a:pPr marL="0" indent="0">
+              <a:buNone/>
+            </a:pPr>
+            <a:r>
+              <a:rPr lang="nb-NO" dirty="0">
+                <a:latin typeface="Consolas" panose="020B0609020204030204" pitchFamily="49" charset="0"/>
+              </a:rPr>
+              <a:t>&gt;&gt;&gt;</a:t>
+            </a:r>
+            <a:endParaRPr lang="nb-NO" dirty="0"/>
+          </a:p>
+        </p:txBody>
+      </p:sp>
+      <p:sp>
+        <p:nvSpPr>
+          <p:cNvPr id="5" name="Footer Placeholder 4">
+            <a:extLst>
+              <a:ext uri="{FF2B5EF4-FFF2-40B4-BE49-F238E27FC236}">
+                <a16:creationId xmlns:a16="http://schemas.microsoft.com/office/drawing/2014/main" id="{767B00C4-1DF5-40AA-B029-F4C3630E7C6A}"/>
+              </a:ext>
+            </a:extLst>
+          </p:cNvPr>
+          <p:cNvSpPr>
+            <a:spLocks noGrp="1"/>
+          </p:cNvSpPr>
+          <p:nvPr>
+            <p:ph type="ftr" sz="quarter" idx="11"/>
+          </p:nvPr>
+        </p:nvSpPr>
+        <p:spPr>
+          <a:xfrm>
+            <a:off x="6937075" y="6310312"/>
+            <a:ext cx="4114800" cy="365125"/>
+          </a:xfrm>
+        </p:spPr>
+        <p:txBody>
+          <a:bodyPr/>
+          <a:lstStyle/>
+          <a:p>
+            <a:pPr>
+              <a:spcAft>
+                <a:spcPts val="600"/>
+              </a:spcAft>
+            </a:pPr>
+            <a:r>
+              <a:rPr lang="nb-NO" dirty="0">
+                <a:solidFill>
+                  <a:schemeClr val="tx1"/>
+                </a:solidFill>
+              </a:rPr>
+              <a:t>Henrik Njølstad &amp; André Martiny</a:t>
+            </a:r>
+          </a:p>
+        </p:txBody>
+      </p:sp>
+      <p:pic>
+        <p:nvPicPr>
+          <p:cNvPr id="2050" name="Picture 2">
+            <a:extLst>
+              <a:ext uri="{FF2B5EF4-FFF2-40B4-BE49-F238E27FC236}">
+                <a16:creationId xmlns:a16="http://schemas.microsoft.com/office/drawing/2014/main" id="{497BAC9D-3202-437C-B12B-E3164F1AB1E7}"/>
+              </a:ext>
+            </a:extLst>
+          </p:cNvPr>
+          <p:cNvPicPr>
+            <a:picLocks noChangeAspect="1" noChangeArrowheads="1"/>
+          </p:cNvPicPr>
+          <p:nvPr/>
+        </p:nvPicPr>
+        <p:blipFill>
+          <a:blip r:embed="rId3">
+            <a:extLst>
+              <a:ext uri="{28A0092B-C50C-407E-A947-70E740481C1C}">
+                <a14:useLocalDpi xmlns:a14="http://schemas.microsoft.com/office/drawing/2010/main" val="0"/>
+              </a:ext>
+            </a:extLst>
+          </a:blip>
+          <a:srcRect/>
+          <a:stretch>
+            <a:fillRect/>
+          </a:stretch>
+        </p:blipFill>
+        <p:spPr bwMode="auto">
+          <a:xfrm>
+            <a:off x="8613475" y="1679068"/>
+            <a:ext cx="2438400" cy="2438400"/>
+          </a:xfrm>
+          <a:prstGeom prst="rect">
+            <a:avLst/>
+          </a:prstGeom>
+          <a:noFill/>
+          <a:extLst>
+            <a:ext uri="{909E8E84-426E-40DD-AFC4-6F175D3DCCD1}">
+              <a14:hiddenFill xmlns:a14="http://schemas.microsoft.com/office/drawing/2010/main">
+                <a:solidFill>
+                  <a:srgbClr val="FFFFFF"/>
+                </a:solidFill>
+              </a14:hiddenFill>
+            </a:ext>
+          </a:extLst>
+        </p:spPr>
+      </p:pic>
+    </p:spTree>
+    <p:extLst>
+      <p:ext uri="{BB962C8B-B14F-4D97-AF65-F5344CB8AC3E}">
+        <p14:creationId xmlns:p14="http://schemas.microsoft.com/office/powerpoint/2010/main" val="2355140278"/>
+      </p:ext>
+    </p:extLst>
+  </p:cSld>
+  <p:clrMapOvr>
+    <a:masterClrMapping/>
+  </p:clrMapOvr>
+</p:sld>
+</file>
+
+<file path=ppt/slides/slide18.xml><?xml version="1.0" encoding="utf-8"?>
+<p:sld xmlns:a="http://schemas.openxmlformats.org/drawingml/2006/main" xmlns:r="http://schemas.openxmlformats.org/officeDocument/2006/relationships" xmlns:p="http://schemas.openxmlformats.org/presentationml/2006/main">
+  <p:cSld>
+    <p:spTree>
+      <p:nvGrpSpPr>
+        <p:cNvPr id="1" name=""/>
+        <p:cNvGrpSpPr/>
+        <p:nvPr/>
+      </p:nvGrpSpPr>
+      <p:grpSpPr>
+        <a:xfrm>
+          <a:off x="0" y="0"/>
+          <a:ext cx="0" cy="0"/>
+          <a:chOff x="0" y="0"/>
+          <a:chExt cx="0" cy="0"/>
+        </a:xfrm>
+      </p:grpSpPr>
+      <p:sp>
+        <p:nvSpPr>
+          <p:cNvPr id="2" name="Tittel 1">
+            <a:extLst>
+              <a:ext uri="{FF2B5EF4-FFF2-40B4-BE49-F238E27FC236}">
+                <a16:creationId xmlns:a16="http://schemas.microsoft.com/office/drawing/2014/main" id="{C3E6477F-AED9-484F-9621-C53F564119B4}"/>
+              </a:ext>
+            </a:extLst>
+          </p:cNvPr>
+          <p:cNvSpPr>
+            <a:spLocks noGrp="1"/>
+          </p:cNvSpPr>
+          <p:nvPr>
+            <p:ph type="title"/>
+          </p:nvPr>
+        </p:nvSpPr>
+        <p:spPr/>
+        <p:txBody>
+          <a:bodyPr/>
+          <a:lstStyle/>
+          <a:p>
+            <a:r>
+              <a:rPr lang="nb-NO" dirty="0"/>
+              <a:t>Egendefinerte funksjoner</a:t>
+            </a:r>
+          </a:p>
+        </p:txBody>
+      </p:sp>
+      <p:sp>
+        <p:nvSpPr>
+          <p:cNvPr id="3" name="Plassholder for innhold 2">
+            <a:extLst>
+              <a:ext uri="{FF2B5EF4-FFF2-40B4-BE49-F238E27FC236}">
+                <a16:creationId xmlns:a16="http://schemas.microsoft.com/office/drawing/2014/main" id="{18166937-65B3-4DC8-BB43-63584E0D60E0}"/>
+              </a:ext>
+            </a:extLst>
+          </p:cNvPr>
+          <p:cNvSpPr>
+            <a:spLocks noGrp="1"/>
+          </p:cNvSpPr>
+          <p:nvPr>
+            <p:ph idx="4294967295"/>
+          </p:nvPr>
+        </p:nvSpPr>
+        <p:spPr>
+          <a:xfrm>
+            <a:off x="838200" y="1572705"/>
+            <a:ext cx="11130280" cy="4370895"/>
+          </a:xfrm>
+        </p:spPr>
+        <p:txBody>
+          <a:bodyPr>
+            <a:normAutofit/>
+          </a:bodyPr>
+          <a:lstStyle/>
+          <a:p>
+            <a:pPr marL="0" indent="0">
+              <a:buNone/>
+            </a:pPr>
+            <a:r>
+              <a:rPr lang="nb-NO" dirty="0" err="1">
+                <a:solidFill>
+                  <a:srgbClr val="C44026"/>
+                </a:solidFill>
+                <a:latin typeface="Consolas" panose="020B0609020204030204" pitchFamily="49" charset="0"/>
+              </a:rPr>
+              <a:t>def</a:t>
+            </a:r>
+            <a:r>
+              <a:rPr lang="nb-NO" dirty="0">
+                <a:latin typeface="Consolas" panose="020B0609020204030204" pitchFamily="49" charset="0"/>
+              </a:rPr>
+              <a:t> </a:t>
+            </a:r>
+            <a:r>
+              <a:rPr lang="nb-NO" dirty="0" err="1">
+                <a:solidFill>
+                  <a:srgbClr val="9751CB"/>
+                </a:solidFill>
+                <a:latin typeface="Consolas" panose="020B0609020204030204" pitchFamily="49" charset="0"/>
+              </a:rPr>
+              <a:t>ErDeleligMedTo</a:t>
+            </a:r>
+            <a:r>
+              <a:rPr lang="nb-NO" dirty="0">
+                <a:latin typeface="Consolas" panose="020B0609020204030204" pitchFamily="49" charset="0"/>
+              </a:rPr>
+              <a:t>(rundenummer):</a:t>
+            </a:r>
+          </a:p>
+          <a:p>
+            <a:pPr marL="0" indent="0">
+              <a:buNone/>
+            </a:pPr>
+            <a:r>
+              <a:rPr lang="nb-NO" dirty="0">
+                <a:latin typeface="Consolas" panose="020B0609020204030204" pitchFamily="49" charset="0"/>
+              </a:rPr>
+              <a:t>	</a:t>
+            </a:r>
+            <a:r>
+              <a:rPr lang="nb-NO" dirty="0" err="1">
+                <a:solidFill>
+                  <a:srgbClr val="C44026"/>
+                </a:solidFill>
+                <a:latin typeface="Consolas" panose="020B0609020204030204" pitchFamily="49" charset="0"/>
+              </a:rPr>
+              <a:t>return</a:t>
+            </a:r>
+            <a:r>
+              <a:rPr lang="nb-NO" dirty="0">
+                <a:latin typeface="Consolas" panose="020B0609020204030204" pitchFamily="49" charset="0"/>
+              </a:rPr>
+              <a:t> rundenummer % 2 == 0</a:t>
+            </a:r>
+          </a:p>
+          <a:p>
+            <a:pPr marL="0" indent="0">
+              <a:buNone/>
+            </a:pPr>
+            <a:endParaRPr lang="nb-NO" dirty="0">
+              <a:latin typeface="Consolas" panose="020B0609020204030204" pitchFamily="49" charset="0"/>
+            </a:endParaRPr>
+          </a:p>
+          <a:p>
+            <a:pPr marL="0" indent="0">
+              <a:buNone/>
+            </a:pPr>
+            <a:r>
+              <a:rPr lang="nb-NO" dirty="0">
+                <a:latin typeface="Consolas" panose="020B0609020204030204" pitchFamily="49" charset="0"/>
+              </a:rPr>
+              <a:t>&gt;&gt;&gt; test = rundenummer % 2 == 0</a:t>
+            </a:r>
+          </a:p>
+          <a:p>
+            <a:pPr marL="0" indent="0">
+              <a:buNone/>
+            </a:pPr>
+            <a:endParaRPr lang="nb-NO" dirty="0"/>
+          </a:p>
+        </p:txBody>
+      </p:sp>
+      <p:sp>
+        <p:nvSpPr>
+          <p:cNvPr id="5" name="Footer Placeholder 4">
+            <a:extLst>
+              <a:ext uri="{FF2B5EF4-FFF2-40B4-BE49-F238E27FC236}">
+                <a16:creationId xmlns:a16="http://schemas.microsoft.com/office/drawing/2014/main" id="{767B00C4-1DF5-40AA-B029-F4C3630E7C6A}"/>
+              </a:ext>
+            </a:extLst>
+          </p:cNvPr>
+          <p:cNvSpPr>
+            <a:spLocks noGrp="1"/>
+          </p:cNvSpPr>
+          <p:nvPr>
+            <p:ph type="ftr" sz="quarter" idx="11"/>
+          </p:nvPr>
+        </p:nvSpPr>
+        <p:spPr>
+          <a:xfrm>
+            <a:off x="6937075" y="6310312"/>
+            <a:ext cx="4114800" cy="365125"/>
+          </a:xfrm>
+        </p:spPr>
+        <p:txBody>
+          <a:bodyPr/>
+          <a:lstStyle/>
+          <a:p>
+            <a:pPr>
+              <a:spcAft>
+                <a:spcPts val="600"/>
+              </a:spcAft>
+            </a:pPr>
+            <a:r>
+              <a:rPr lang="nb-NO" dirty="0">
+                <a:solidFill>
+                  <a:schemeClr val="tx1"/>
+                </a:solidFill>
+              </a:rPr>
+              <a:t>Henrik Njølstad &amp; André Martiny</a:t>
+            </a:r>
+          </a:p>
+        </p:txBody>
+      </p:sp>
+      <p:pic>
+        <p:nvPicPr>
+          <p:cNvPr id="2050" name="Picture 2">
+            <a:extLst>
+              <a:ext uri="{FF2B5EF4-FFF2-40B4-BE49-F238E27FC236}">
+                <a16:creationId xmlns:a16="http://schemas.microsoft.com/office/drawing/2014/main" id="{497BAC9D-3202-437C-B12B-E3164F1AB1E7}"/>
+              </a:ext>
+            </a:extLst>
+          </p:cNvPr>
+          <p:cNvPicPr>
+            <a:picLocks noChangeAspect="1" noChangeArrowheads="1"/>
+          </p:cNvPicPr>
+          <p:nvPr/>
+        </p:nvPicPr>
+        <p:blipFill>
+          <a:blip r:embed="rId3">
+            <a:extLst>
+              <a:ext uri="{28A0092B-C50C-407E-A947-70E740481C1C}">
+                <a14:useLocalDpi xmlns:a14="http://schemas.microsoft.com/office/drawing/2010/main" val="0"/>
+              </a:ext>
+            </a:extLst>
+          </a:blip>
+          <a:srcRect/>
+          <a:stretch>
+            <a:fillRect/>
+          </a:stretch>
+        </p:blipFill>
+        <p:spPr bwMode="auto">
+          <a:xfrm>
+            <a:off x="8613475" y="1679068"/>
+            <a:ext cx="2438400" cy="2438400"/>
+          </a:xfrm>
+          <a:prstGeom prst="rect">
+            <a:avLst/>
+          </a:prstGeom>
+          <a:noFill/>
+          <a:extLst>
+            <a:ext uri="{909E8E84-426E-40DD-AFC4-6F175D3DCCD1}">
+              <a14:hiddenFill xmlns:a14="http://schemas.microsoft.com/office/drawing/2010/main">
+                <a:solidFill>
+                  <a:srgbClr val="FFFFFF"/>
+                </a:solidFill>
+              </a14:hiddenFill>
+            </a:ext>
+          </a:extLst>
+        </p:spPr>
+      </p:pic>
+    </p:spTree>
+    <p:extLst>
+      <p:ext uri="{BB962C8B-B14F-4D97-AF65-F5344CB8AC3E}">
+        <p14:creationId xmlns:p14="http://schemas.microsoft.com/office/powerpoint/2010/main" val="3470671077"/>
+      </p:ext>
+    </p:extLst>
+  </p:cSld>
+  <p:clrMapOvr>
+    <a:masterClrMapping/>
+  </p:clrMapOvr>
+</p:sld>
+</file>
+
+<file path=ppt/slides/slide19.xml><?xml version="1.0" encoding="utf-8"?>
+<p:sld xmlns:a="http://schemas.openxmlformats.org/drawingml/2006/main" xmlns:r="http://schemas.openxmlformats.org/officeDocument/2006/relationships" xmlns:p="http://schemas.openxmlformats.org/presentationml/2006/main">
+  <p:cSld>
+    <p:spTree>
+      <p:nvGrpSpPr>
+        <p:cNvPr id="1" name=""/>
+        <p:cNvGrpSpPr/>
+        <p:nvPr/>
+      </p:nvGrpSpPr>
+      <p:grpSpPr>
+        <a:xfrm>
+          <a:off x="0" y="0"/>
+          <a:ext cx="0" cy="0"/>
+          <a:chOff x="0" y="0"/>
+          <a:chExt cx="0" cy="0"/>
+        </a:xfrm>
+      </p:grpSpPr>
+      <p:sp>
+        <p:nvSpPr>
+          <p:cNvPr id="2" name="Tittel 1">
+            <a:extLst>
+              <a:ext uri="{FF2B5EF4-FFF2-40B4-BE49-F238E27FC236}">
+                <a16:creationId xmlns:a16="http://schemas.microsoft.com/office/drawing/2014/main" id="{C3E6477F-AED9-484F-9621-C53F564119B4}"/>
+              </a:ext>
+            </a:extLst>
+          </p:cNvPr>
+          <p:cNvSpPr>
+            <a:spLocks noGrp="1"/>
+          </p:cNvSpPr>
+          <p:nvPr>
+            <p:ph type="title"/>
+          </p:nvPr>
+        </p:nvSpPr>
+        <p:spPr/>
+        <p:txBody>
+          <a:bodyPr/>
+          <a:lstStyle/>
+          <a:p>
+            <a:r>
+              <a:rPr lang="nb-NO" dirty="0"/>
+              <a:t>Egendefinerte funksjoner</a:t>
+            </a:r>
+          </a:p>
+        </p:txBody>
+      </p:sp>
+      <p:sp>
+        <p:nvSpPr>
+          <p:cNvPr id="3" name="Plassholder for innhold 2">
+            <a:extLst>
+              <a:ext uri="{FF2B5EF4-FFF2-40B4-BE49-F238E27FC236}">
+                <a16:creationId xmlns:a16="http://schemas.microsoft.com/office/drawing/2014/main" id="{18166937-65B3-4DC8-BB43-63584E0D60E0}"/>
+              </a:ext>
+            </a:extLst>
+          </p:cNvPr>
+          <p:cNvSpPr>
+            <a:spLocks noGrp="1"/>
+          </p:cNvSpPr>
+          <p:nvPr>
+            <p:ph idx="4294967295"/>
+          </p:nvPr>
+        </p:nvSpPr>
+        <p:spPr>
+          <a:xfrm>
+            <a:off x="838200" y="1572705"/>
+            <a:ext cx="11130280" cy="4370895"/>
+          </a:xfrm>
+        </p:spPr>
+        <p:txBody>
+          <a:bodyPr>
+            <a:normAutofit/>
+          </a:bodyPr>
+          <a:lstStyle/>
+          <a:p>
+            <a:pPr marL="0" indent="0">
+              <a:buNone/>
+            </a:pPr>
+            <a:r>
+              <a:rPr lang="nb-NO" dirty="0" err="1">
+                <a:solidFill>
+                  <a:srgbClr val="C44026"/>
+                </a:solidFill>
+                <a:latin typeface="Consolas" panose="020B0609020204030204" pitchFamily="49" charset="0"/>
+              </a:rPr>
+              <a:t>def</a:t>
+            </a:r>
+            <a:r>
+              <a:rPr lang="nb-NO" dirty="0">
+                <a:latin typeface="Consolas" panose="020B0609020204030204" pitchFamily="49" charset="0"/>
+              </a:rPr>
+              <a:t> </a:t>
+            </a:r>
+            <a:r>
+              <a:rPr lang="nb-NO" dirty="0" err="1">
+                <a:solidFill>
+                  <a:srgbClr val="9751CB"/>
+                </a:solidFill>
+                <a:latin typeface="Consolas" panose="020B0609020204030204" pitchFamily="49" charset="0"/>
+              </a:rPr>
+              <a:t>ErDeleligMedTo</a:t>
+            </a:r>
+            <a:r>
+              <a:rPr lang="nb-NO" dirty="0">
+                <a:latin typeface="Consolas" panose="020B0609020204030204" pitchFamily="49" charset="0"/>
+              </a:rPr>
+              <a:t>(rundenummer):</a:t>
+            </a:r>
+          </a:p>
+          <a:p>
+            <a:pPr marL="0" indent="0">
+              <a:buNone/>
+            </a:pPr>
+            <a:r>
+              <a:rPr lang="nb-NO" dirty="0">
+                <a:latin typeface="Consolas" panose="020B0609020204030204" pitchFamily="49" charset="0"/>
+              </a:rPr>
+              <a:t>	</a:t>
+            </a:r>
+            <a:r>
+              <a:rPr lang="nb-NO" dirty="0" err="1">
+                <a:solidFill>
+                  <a:srgbClr val="C44026"/>
+                </a:solidFill>
+                <a:latin typeface="Consolas" panose="020B0609020204030204" pitchFamily="49" charset="0"/>
+              </a:rPr>
+              <a:t>return</a:t>
+            </a:r>
+            <a:r>
+              <a:rPr lang="nb-NO" dirty="0">
+                <a:latin typeface="Consolas" panose="020B0609020204030204" pitchFamily="49" charset="0"/>
+              </a:rPr>
+              <a:t> rundenummer % 2 == 0</a:t>
+            </a:r>
+          </a:p>
+          <a:p>
+            <a:pPr marL="0" indent="0">
+              <a:buNone/>
+            </a:pPr>
+            <a:endParaRPr lang="nb-NO" dirty="0">
+              <a:latin typeface="Consolas" panose="020B0609020204030204" pitchFamily="49" charset="0"/>
+            </a:endParaRPr>
+          </a:p>
+          <a:p>
+            <a:pPr marL="0" indent="0">
+              <a:buNone/>
+            </a:pPr>
+            <a:r>
+              <a:rPr lang="nb-NO" dirty="0">
+                <a:latin typeface="Consolas" panose="020B0609020204030204" pitchFamily="49" charset="0"/>
+              </a:rPr>
+              <a:t>&gt;&gt;&gt; test = rundenummer % 2 == 0</a:t>
+            </a:r>
+          </a:p>
+          <a:p>
+            <a:pPr marL="0" indent="0">
+              <a:buNone/>
+            </a:pPr>
+            <a:r>
+              <a:rPr lang="nb-NO" dirty="0">
+                <a:latin typeface="Consolas" panose="020B0609020204030204" pitchFamily="49" charset="0"/>
+              </a:rPr>
+              <a:t>&gt;&gt;&gt; </a:t>
+            </a:r>
+            <a:r>
+              <a:rPr lang="nb-NO" dirty="0" err="1">
+                <a:latin typeface="Consolas" panose="020B0609020204030204" pitchFamily="49" charset="0"/>
+              </a:rPr>
+              <a:t>print</a:t>
+            </a:r>
+            <a:r>
+              <a:rPr lang="nb-NO" dirty="0">
+                <a:latin typeface="Consolas" panose="020B0609020204030204" pitchFamily="49" charset="0"/>
+              </a:rPr>
+              <a:t>(test)</a:t>
+            </a:r>
+          </a:p>
+        </p:txBody>
+      </p:sp>
+      <p:sp>
+        <p:nvSpPr>
+          <p:cNvPr id="5" name="Footer Placeholder 4">
+            <a:extLst>
+              <a:ext uri="{FF2B5EF4-FFF2-40B4-BE49-F238E27FC236}">
+                <a16:creationId xmlns:a16="http://schemas.microsoft.com/office/drawing/2014/main" id="{767B00C4-1DF5-40AA-B029-F4C3630E7C6A}"/>
+              </a:ext>
+            </a:extLst>
+          </p:cNvPr>
+          <p:cNvSpPr>
+            <a:spLocks noGrp="1"/>
+          </p:cNvSpPr>
+          <p:nvPr>
+            <p:ph type="ftr" sz="quarter" idx="11"/>
+          </p:nvPr>
+        </p:nvSpPr>
+        <p:spPr>
+          <a:xfrm>
+            <a:off x="6937075" y="6310312"/>
+            <a:ext cx="4114800" cy="365125"/>
+          </a:xfrm>
+        </p:spPr>
+        <p:txBody>
+          <a:bodyPr/>
+          <a:lstStyle/>
+          <a:p>
+            <a:pPr>
+              <a:spcAft>
+                <a:spcPts val="600"/>
+              </a:spcAft>
+            </a:pPr>
+            <a:r>
+              <a:rPr lang="nb-NO" dirty="0">
+                <a:solidFill>
+                  <a:schemeClr val="tx1"/>
+                </a:solidFill>
+              </a:rPr>
+              <a:t>Henrik Njølstad &amp; André Martiny</a:t>
+            </a:r>
+          </a:p>
+        </p:txBody>
+      </p:sp>
+      <p:pic>
+        <p:nvPicPr>
+          <p:cNvPr id="2050" name="Picture 2">
+            <a:extLst>
+              <a:ext uri="{FF2B5EF4-FFF2-40B4-BE49-F238E27FC236}">
+                <a16:creationId xmlns:a16="http://schemas.microsoft.com/office/drawing/2014/main" id="{497BAC9D-3202-437C-B12B-E3164F1AB1E7}"/>
+              </a:ext>
+            </a:extLst>
+          </p:cNvPr>
+          <p:cNvPicPr>
+            <a:picLocks noChangeAspect="1" noChangeArrowheads="1"/>
+          </p:cNvPicPr>
+          <p:nvPr/>
+        </p:nvPicPr>
+        <p:blipFill>
+          <a:blip r:embed="rId3">
+            <a:extLst>
+              <a:ext uri="{28A0092B-C50C-407E-A947-70E740481C1C}">
+                <a14:useLocalDpi xmlns:a14="http://schemas.microsoft.com/office/drawing/2010/main" val="0"/>
+              </a:ext>
+            </a:extLst>
+          </a:blip>
+          <a:srcRect/>
+          <a:stretch>
+            <a:fillRect/>
+          </a:stretch>
+        </p:blipFill>
+        <p:spPr bwMode="auto">
+          <a:xfrm>
+            <a:off x="8613475" y="1679068"/>
+            <a:ext cx="2438400" cy="2438400"/>
+          </a:xfrm>
+          <a:prstGeom prst="rect">
+            <a:avLst/>
+          </a:prstGeom>
+          <a:noFill/>
+          <a:extLst>
+            <a:ext uri="{909E8E84-426E-40DD-AFC4-6F175D3DCCD1}">
+              <a14:hiddenFill xmlns:a14="http://schemas.microsoft.com/office/drawing/2010/main">
+                <a:solidFill>
+                  <a:srgbClr val="FFFFFF"/>
+                </a:solidFill>
+              </a14:hiddenFill>
+            </a:ext>
+          </a:extLst>
+        </p:spPr>
+      </p:pic>
+    </p:spTree>
+    <p:extLst>
+      <p:ext uri="{BB962C8B-B14F-4D97-AF65-F5344CB8AC3E}">
+        <p14:creationId xmlns:p14="http://schemas.microsoft.com/office/powerpoint/2010/main" val="3513622728"/>
       </p:ext>
     </p:extLst>
   </p:cSld>
@@ -11174,6 +13840,490 @@
 </p:sld>
 </file>
 
+<file path=ppt/slides/slide20.xml><?xml version="1.0" encoding="utf-8"?>
+<p:sld xmlns:a="http://schemas.openxmlformats.org/drawingml/2006/main" xmlns:r="http://schemas.openxmlformats.org/officeDocument/2006/relationships" xmlns:p="http://schemas.openxmlformats.org/presentationml/2006/main">
+  <p:cSld>
+    <p:spTree>
+      <p:nvGrpSpPr>
+        <p:cNvPr id="1" name=""/>
+        <p:cNvGrpSpPr/>
+        <p:nvPr/>
+      </p:nvGrpSpPr>
+      <p:grpSpPr>
+        <a:xfrm>
+          <a:off x="0" y="0"/>
+          <a:ext cx="0" cy="0"/>
+          <a:chOff x="0" y="0"/>
+          <a:chExt cx="0" cy="0"/>
+        </a:xfrm>
+      </p:grpSpPr>
+      <p:sp>
+        <p:nvSpPr>
+          <p:cNvPr id="2" name="Tittel 1">
+            <a:extLst>
+              <a:ext uri="{FF2B5EF4-FFF2-40B4-BE49-F238E27FC236}">
+                <a16:creationId xmlns:a16="http://schemas.microsoft.com/office/drawing/2014/main" id="{C3E6477F-AED9-484F-9621-C53F564119B4}"/>
+              </a:ext>
+            </a:extLst>
+          </p:cNvPr>
+          <p:cNvSpPr>
+            <a:spLocks noGrp="1"/>
+          </p:cNvSpPr>
+          <p:nvPr>
+            <p:ph type="title"/>
+          </p:nvPr>
+        </p:nvSpPr>
+        <p:spPr/>
+        <p:txBody>
+          <a:bodyPr/>
+          <a:lstStyle/>
+          <a:p>
+            <a:r>
+              <a:rPr lang="nb-NO" dirty="0"/>
+              <a:t>Egendefinerte funksjoner</a:t>
+            </a:r>
+          </a:p>
+        </p:txBody>
+      </p:sp>
+      <p:sp>
+        <p:nvSpPr>
+          <p:cNvPr id="3" name="Plassholder for innhold 2">
+            <a:extLst>
+              <a:ext uri="{FF2B5EF4-FFF2-40B4-BE49-F238E27FC236}">
+                <a16:creationId xmlns:a16="http://schemas.microsoft.com/office/drawing/2014/main" id="{18166937-65B3-4DC8-BB43-63584E0D60E0}"/>
+              </a:ext>
+            </a:extLst>
+          </p:cNvPr>
+          <p:cNvSpPr>
+            <a:spLocks noGrp="1"/>
+          </p:cNvSpPr>
+          <p:nvPr>
+            <p:ph idx="4294967295"/>
+          </p:nvPr>
+        </p:nvSpPr>
+        <p:spPr>
+          <a:xfrm>
+            <a:off x="838200" y="1572705"/>
+            <a:ext cx="11130280" cy="4370895"/>
+          </a:xfrm>
+        </p:spPr>
+        <p:txBody>
+          <a:bodyPr>
+            <a:normAutofit/>
+          </a:bodyPr>
+          <a:lstStyle/>
+          <a:p>
+            <a:pPr marL="0" indent="0">
+              <a:buNone/>
+            </a:pPr>
+            <a:r>
+              <a:rPr lang="nb-NO" dirty="0" err="1">
+                <a:solidFill>
+                  <a:srgbClr val="C44026"/>
+                </a:solidFill>
+                <a:latin typeface="Consolas" panose="020B0609020204030204" pitchFamily="49" charset="0"/>
+              </a:rPr>
+              <a:t>def</a:t>
+            </a:r>
+            <a:r>
+              <a:rPr lang="nb-NO" dirty="0">
+                <a:latin typeface="Consolas" panose="020B0609020204030204" pitchFamily="49" charset="0"/>
+              </a:rPr>
+              <a:t> </a:t>
+            </a:r>
+            <a:r>
+              <a:rPr lang="nb-NO" dirty="0" err="1">
+                <a:solidFill>
+                  <a:srgbClr val="9751CB"/>
+                </a:solidFill>
+                <a:latin typeface="Consolas" panose="020B0609020204030204" pitchFamily="49" charset="0"/>
+              </a:rPr>
+              <a:t>ErDeleligMedTo</a:t>
+            </a:r>
+            <a:r>
+              <a:rPr lang="nb-NO" dirty="0">
+                <a:latin typeface="Consolas" panose="020B0609020204030204" pitchFamily="49" charset="0"/>
+              </a:rPr>
+              <a:t>(rundenummer):</a:t>
+            </a:r>
+          </a:p>
+          <a:p>
+            <a:pPr marL="0" indent="0">
+              <a:buNone/>
+            </a:pPr>
+            <a:r>
+              <a:rPr lang="nb-NO" dirty="0">
+                <a:latin typeface="Consolas" panose="020B0609020204030204" pitchFamily="49" charset="0"/>
+              </a:rPr>
+              <a:t>	</a:t>
+            </a:r>
+            <a:r>
+              <a:rPr lang="nb-NO" dirty="0" err="1">
+                <a:solidFill>
+                  <a:srgbClr val="C44026"/>
+                </a:solidFill>
+                <a:latin typeface="Consolas" panose="020B0609020204030204" pitchFamily="49" charset="0"/>
+              </a:rPr>
+              <a:t>return</a:t>
+            </a:r>
+            <a:r>
+              <a:rPr lang="nb-NO" dirty="0">
+                <a:latin typeface="Consolas" panose="020B0609020204030204" pitchFamily="49" charset="0"/>
+              </a:rPr>
+              <a:t> rundenummer % 2 == 0</a:t>
+            </a:r>
+          </a:p>
+          <a:p>
+            <a:pPr marL="0" indent="0">
+              <a:buNone/>
+            </a:pPr>
+            <a:endParaRPr lang="nb-NO" dirty="0">
+              <a:latin typeface="Consolas" panose="020B0609020204030204" pitchFamily="49" charset="0"/>
+            </a:endParaRPr>
+          </a:p>
+          <a:p>
+            <a:pPr marL="0" indent="0">
+              <a:buNone/>
+            </a:pPr>
+            <a:r>
+              <a:rPr lang="nb-NO" dirty="0">
+                <a:latin typeface="Consolas" panose="020B0609020204030204" pitchFamily="49" charset="0"/>
+              </a:rPr>
+              <a:t>&gt;&gt;&gt; test = rundenummer % 2 == 0</a:t>
+            </a:r>
+          </a:p>
+          <a:p>
+            <a:pPr marL="0" indent="0">
+              <a:buNone/>
+            </a:pPr>
+            <a:r>
+              <a:rPr lang="nb-NO" dirty="0">
+                <a:latin typeface="Consolas" panose="020B0609020204030204" pitchFamily="49" charset="0"/>
+              </a:rPr>
+              <a:t>&gt;&gt;&gt; </a:t>
+            </a:r>
+            <a:r>
+              <a:rPr lang="nb-NO" dirty="0" err="1">
+                <a:latin typeface="Consolas" panose="020B0609020204030204" pitchFamily="49" charset="0"/>
+              </a:rPr>
+              <a:t>print</a:t>
+            </a:r>
+            <a:r>
+              <a:rPr lang="nb-NO" dirty="0">
+                <a:latin typeface="Consolas" panose="020B0609020204030204" pitchFamily="49" charset="0"/>
+              </a:rPr>
+              <a:t>(test)</a:t>
+            </a:r>
+          </a:p>
+          <a:p>
+            <a:pPr marL="0" indent="0">
+              <a:buNone/>
+            </a:pPr>
+            <a:r>
+              <a:rPr lang="nb-NO" dirty="0">
+                <a:solidFill>
+                  <a:schemeClr val="accent4">
+                    <a:lumMod val="60000"/>
+                    <a:lumOff val="40000"/>
+                  </a:schemeClr>
+                </a:solidFill>
+                <a:latin typeface="Consolas" panose="020B0609020204030204" pitchFamily="49" charset="0"/>
+              </a:rPr>
+              <a:t>True</a:t>
+            </a:r>
+          </a:p>
+          <a:p>
+            <a:pPr marL="0" indent="0">
+              <a:buNone/>
+            </a:pPr>
+            <a:endParaRPr lang="nb-NO" dirty="0"/>
+          </a:p>
+        </p:txBody>
+      </p:sp>
+      <p:sp>
+        <p:nvSpPr>
+          <p:cNvPr id="5" name="Footer Placeholder 4">
+            <a:extLst>
+              <a:ext uri="{FF2B5EF4-FFF2-40B4-BE49-F238E27FC236}">
+                <a16:creationId xmlns:a16="http://schemas.microsoft.com/office/drawing/2014/main" id="{767B00C4-1DF5-40AA-B029-F4C3630E7C6A}"/>
+              </a:ext>
+            </a:extLst>
+          </p:cNvPr>
+          <p:cNvSpPr>
+            <a:spLocks noGrp="1"/>
+          </p:cNvSpPr>
+          <p:nvPr>
+            <p:ph type="ftr" sz="quarter" idx="11"/>
+          </p:nvPr>
+        </p:nvSpPr>
+        <p:spPr>
+          <a:xfrm>
+            <a:off x="6937075" y="6310312"/>
+            <a:ext cx="4114800" cy="365125"/>
+          </a:xfrm>
+        </p:spPr>
+        <p:txBody>
+          <a:bodyPr/>
+          <a:lstStyle/>
+          <a:p>
+            <a:pPr>
+              <a:spcAft>
+                <a:spcPts val="600"/>
+              </a:spcAft>
+            </a:pPr>
+            <a:r>
+              <a:rPr lang="nb-NO" dirty="0">
+                <a:solidFill>
+                  <a:schemeClr val="tx1"/>
+                </a:solidFill>
+              </a:rPr>
+              <a:t>Henrik Njølstad &amp; André Martiny</a:t>
+            </a:r>
+          </a:p>
+        </p:txBody>
+      </p:sp>
+      <p:pic>
+        <p:nvPicPr>
+          <p:cNvPr id="2050" name="Picture 2">
+            <a:extLst>
+              <a:ext uri="{FF2B5EF4-FFF2-40B4-BE49-F238E27FC236}">
+                <a16:creationId xmlns:a16="http://schemas.microsoft.com/office/drawing/2014/main" id="{497BAC9D-3202-437C-B12B-E3164F1AB1E7}"/>
+              </a:ext>
+            </a:extLst>
+          </p:cNvPr>
+          <p:cNvPicPr>
+            <a:picLocks noChangeAspect="1" noChangeArrowheads="1"/>
+          </p:cNvPicPr>
+          <p:nvPr/>
+        </p:nvPicPr>
+        <p:blipFill>
+          <a:blip r:embed="rId3">
+            <a:extLst>
+              <a:ext uri="{28A0092B-C50C-407E-A947-70E740481C1C}">
+                <a14:useLocalDpi xmlns:a14="http://schemas.microsoft.com/office/drawing/2010/main" val="0"/>
+              </a:ext>
+            </a:extLst>
+          </a:blip>
+          <a:srcRect/>
+          <a:stretch>
+            <a:fillRect/>
+          </a:stretch>
+        </p:blipFill>
+        <p:spPr bwMode="auto">
+          <a:xfrm>
+            <a:off x="8613475" y="1679068"/>
+            <a:ext cx="2438400" cy="2438400"/>
+          </a:xfrm>
+          <a:prstGeom prst="rect">
+            <a:avLst/>
+          </a:prstGeom>
+          <a:noFill/>
+          <a:extLst>
+            <a:ext uri="{909E8E84-426E-40DD-AFC4-6F175D3DCCD1}">
+              <a14:hiddenFill xmlns:a14="http://schemas.microsoft.com/office/drawing/2010/main">
+                <a:solidFill>
+                  <a:srgbClr val="FFFFFF"/>
+                </a:solidFill>
+              </a14:hiddenFill>
+            </a:ext>
+          </a:extLst>
+        </p:spPr>
+      </p:pic>
+    </p:spTree>
+    <p:extLst>
+      <p:ext uri="{BB962C8B-B14F-4D97-AF65-F5344CB8AC3E}">
+        <p14:creationId xmlns:p14="http://schemas.microsoft.com/office/powerpoint/2010/main" val="436915314"/>
+      </p:ext>
+    </p:extLst>
+  </p:cSld>
+  <p:clrMapOvr>
+    <a:masterClrMapping/>
+  </p:clrMapOvr>
+</p:sld>
+</file>
+
+<file path=ppt/slides/slide21.xml><?xml version="1.0" encoding="utf-8"?>
+<p:sld xmlns:a="http://schemas.openxmlformats.org/drawingml/2006/main" xmlns:r="http://schemas.openxmlformats.org/officeDocument/2006/relationships" xmlns:p="http://schemas.openxmlformats.org/presentationml/2006/main">
+  <p:cSld>
+    <p:spTree>
+      <p:nvGrpSpPr>
+        <p:cNvPr id="1" name=""/>
+        <p:cNvGrpSpPr/>
+        <p:nvPr/>
+      </p:nvGrpSpPr>
+      <p:grpSpPr>
+        <a:xfrm>
+          <a:off x="0" y="0"/>
+          <a:ext cx="0" cy="0"/>
+          <a:chOff x="0" y="0"/>
+          <a:chExt cx="0" cy="0"/>
+        </a:xfrm>
+      </p:grpSpPr>
+      <p:sp>
+        <p:nvSpPr>
+          <p:cNvPr id="2" name="Tittel 1">
+            <a:extLst>
+              <a:ext uri="{FF2B5EF4-FFF2-40B4-BE49-F238E27FC236}">
+                <a16:creationId xmlns:a16="http://schemas.microsoft.com/office/drawing/2014/main" id="{C3E6477F-AED9-484F-9621-C53F564119B4}"/>
+              </a:ext>
+            </a:extLst>
+          </p:cNvPr>
+          <p:cNvSpPr>
+            <a:spLocks noGrp="1"/>
+          </p:cNvSpPr>
+          <p:nvPr>
+            <p:ph type="title"/>
+          </p:nvPr>
+        </p:nvSpPr>
+        <p:spPr/>
+        <p:txBody>
+          <a:bodyPr/>
+          <a:lstStyle/>
+          <a:p>
+            <a:r>
+              <a:rPr lang="nb-NO" dirty="0"/>
+              <a:t>Prøv selv</a:t>
+            </a:r>
+          </a:p>
+        </p:txBody>
+      </p:sp>
+      <p:sp>
+        <p:nvSpPr>
+          <p:cNvPr id="3" name="Plassholder for innhold 2">
+            <a:extLst>
+              <a:ext uri="{FF2B5EF4-FFF2-40B4-BE49-F238E27FC236}">
+                <a16:creationId xmlns:a16="http://schemas.microsoft.com/office/drawing/2014/main" id="{18166937-65B3-4DC8-BB43-63584E0D60E0}"/>
+              </a:ext>
+            </a:extLst>
+          </p:cNvPr>
+          <p:cNvSpPr>
+            <a:spLocks noGrp="1"/>
+          </p:cNvSpPr>
+          <p:nvPr>
+            <p:ph idx="4294967295"/>
+          </p:nvPr>
+        </p:nvSpPr>
+        <p:spPr>
+          <a:xfrm>
+            <a:off x="762000" y="2411952"/>
+            <a:ext cx="10515600" cy="3003328"/>
+          </a:xfrm>
+        </p:spPr>
+        <p:txBody>
+          <a:bodyPr>
+            <a:normAutofit lnSpcReduction="10000"/>
+          </a:bodyPr>
+          <a:lstStyle/>
+          <a:p>
+            <a:pPr marL="0" indent="0" algn="ctr">
+              <a:buNone/>
+            </a:pPr>
+            <a:r>
+              <a:rPr lang="nb-NO" sz="4400" dirty="0">
+                <a:latin typeface="Consolas" panose="020B0609020204030204" pitchFamily="49" charset="0"/>
+              </a:rPr>
+              <a:t>uia-mn.github.io/workshop</a:t>
+            </a:r>
+          </a:p>
+          <a:p>
+            <a:pPr marL="0" indent="0">
+              <a:buNone/>
+            </a:pPr>
+            <a:endParaRPr lang="nb-NO" sz="4000" dirty="0">
+              <a:latin typeface="Consolas" panose="020B0609020204030204" pitchFamily="49" charset="0"/>
+            </a:endParaRPr>
+          </a:p>
+          <a:p>
+            <a:pPr marL="0" indent="0">
+              <a:buNone/>
+            </a:pPr>
+            <a:r>
+              <a:rPr lang="nb-NO" sz="3200" dirty="0">
+                <a:latin typeface="Consolas" panose="020B0609020204030204" pitchFamily="49" charset="0"/>
+              </a:rPr>
+              <a:t>Til hver oppgave har vi valgt ut én eller to konsept som du skal bli kjent med. Klikk på lenken i oppgaven mer informasjon om hvordan den fungerer.</a:t>
+            </a:r>
+          </a:p>
+          <a:p>
+            <a:endParaRPr lang="nb-NO" sz="4000" dirty="0">
+              <a:latin typeface="Consolas" panose="020B0609020204030204" pitchFamily="49" charset="0"/>
+            </a:endParaRPr>
+          </a:p>
+          <a:p>
+            <a:pPr lvl="1"/>
+            <a:endParaRPr lang="nb-NO" sz="3600" dirty="0">
+              <a:latin typeface="Consolas" panose="020B0609020204030204" pitchFamily="49" charset="0"/>
+            </a:endParaRPr>
+          </a:p>
+          <a:p>
+            <a:pPr lvl="1"/>
+            <a:endParaRPr lang="nb-NO" sz="3600" dirty="0">
+              <a:latin typeface="Consolas" panose="020B0609020204030204" pitchFamily="49" charset="0"/>
+            </a:endParaRPr>
+          </a:p>
+          <a:p>
+            <a:pPr lvl="1"/>
+            <a:endParaRPr lang="nb-NO" sz="3600" dirty="0">
+              <a:latin typeface="Consolas" panose="020B0609020204030204" pitchFamily="49" charset="0"/>
+            </a:endParaRPr>
+          </a:p>
+        </p:txBody>
+      </p:sp>
+      <p:sp>
+        <p:nvSpPr>
+          <p:cNvPr id="5" name="Footer Placeholder 4">
+            <a:extLst>
+              <a:ext uri="{FF2B5EF4-FFF2-40B4-BE49-F238E27FC236}">
+                <a16:creationId xmlns:a16="http://schemas.microsoft.com/office/drawing/2014/main" id="{2D147248-02D2-4FB6-802E-640535C4B302}"/>
+              </a:ext>
+            </a:extLst>
+          </p:cNvPr>
+          <p:cNvSpPr>
+            <a:spLocks noGrp="1"/>
+          </p:cNvSpPr>
+          <p:nvPr>
+            <p:ph type="ftr" sz="quarter" idx="11"/>
+          </p:nvPr>
+        </p:nvSpPr>
+        <p:spPr>
+          <a:xfrm>
+            <a:off x="6937075" y="6310312"/>
+            <a:ext cx="4114800" cy="365125"/>
+          </a:xfrm>
+        </p:spPr>
+        <p:txBody>
+          <a:bodyPr/>
+          <a:lstStyle/>
+          <a:p>
+            <a:pPr>
+              <a:spcAft>
+                <a:spcPts val="600"/>
+              </a:spcAft>
+            </a:pPr>
+            <a:r>
+              <a:rPr lang="nb-NO" dirty="0">
+                <a:solidFill>
+                  <a:schemeClr val="tx1"/>
+                </a:solidFill>
+              </a:rPr>
+              <a:t>Henrik Njølstad &amp; André Martiny</a:t>
+            </a:r>
+          </a:p>
+        </p:txBody>
+      </p:sp>
+    </p:spTree>
+    <p:extLst>
+      <p:ext uri="{BB962C8B-B14F-4D97-AF65-F5344CB8AC3E}">
+        <p14:creationId xmlns:p14="http://schemas.microsoft.com/office/powerpoint/2010/main" val="2476041199"/>
+      </p:ext>
+    </p:extLst>
+  </p:cSld>
+  <p:clrMapOvr>
+    <a:masterClrMapping/>
+  </p:clrMapOvr>
+</p:sld>
+</file>
+
 <file path=ppt/slides/slide3.xml><?xml version="1.0" encoding="utf-8"?>
 <p:sld xmlns:a="http://schemas.openxmlformats.org/drawingml/2006/main" xmlns:r="http://schemas.openxmlformats.org/officeDocument/2006/relationships" xmlns:p="http://schemas.openxmlformats.org/presentationml/2006/main">
   <p:cSld>
@@ -12822,17 +15972,6 @@
           </a:bodyPr>
           <a:lstStyle/>
           <a:p>
-            <a:pPr marL="0" indent="0">
-              <a:buNone/>
-            </a:pPr>
-            <a:r>
-              <a:rPr lang="nb-NO" dirty="0">
-                <a:latin typeface="Consolas" panose="020B0609020204030204" pitchFamily="49" charset="0"/>
-              </a:rPr>
-              <a:t>FIZZBUZZ</a:t>
-            </a:r>
-          </a:p>
-          <a:p>
             <a:endParaRPr lang="nb-NO" dirty="0"/>
           </a:p>
           <a:p>
@@ -12893,32 +16032,96 @@
       </p:sp>
       <p:pic>
         <p:nvPicPr>
-          <p:cNvPr id="6" name="Bilde 5">
+          <p:cNvPr id="1032" name="Picture 8">
             <a:extLst>
               <a:ext uri="{FF2B5EF4-FFF2-40B4-BE49-F238E27FC236}">
-                <a16:creationId xmlns:a16="http://schemas.microsoft.com/office/drawing/2014/main" id="{8EE9994E-7D7E-4F16-ACF9-D85B96375680}"/>
+                <a16:creationId xmlns:a16="http://schemas.microsoft.com/office/drawing/2014/main" id="{0FB1949E-CB87-44AD-B2AF-37A797B6240B}"/>
               </a:ext>
             </a:extLst>
           </p:cNvPr>
           <p:cNvPicPr>
-            <a:picLocks noChangeAspect="1"/>
+            <a:picLocks noChangeAspect="1" noChangeArrowheads="1"/>
           </p:cNvPicPr>
           <p:nvPr/>
         </p:nvPicPr>
         <p:blipFill>
-          <a:blip r:embed="rId3"/>
+          <a:blip r:embed="rId3">
+            <a:extLst>
+              <a:ext uri="{28A0092B-C50C-407E-A947-70E740481C1C}">
+                <a14:useLocalDpi xmlns:a14="http://schemas.microsoft.com/office/drawing/2010/main" val="0"/>
+              </a:ext>
+            </a:extLst>
+          </a:blip>
+          <a:srcRect/>
           <a:stretch>
             <a:fillRect/>
           </a:stretch>
         </p:blipFill>
-        <p:spPr>
+        <p:spPr bwMode="auto">
           <a:xfrm>
-            <a:off x="940378" y="1572705"/>
-            <a:ext cx="3165416" cy="4477053"/>
+            <a:off x="6574790" y="1433512"/>
+            <a:ext cx="3390900" cy="4876800"/>
           </a:xfrm>
           <a:prstGeom prst="rect">
             <a:avLst/>
           </a:prstGeom>
+          <a:noFill/>
+          <a:extLst>
+            <a:ext uri="{909E8E84-426E-40DD-AFC4-6F175D3DCCD1}">
+              <a14:hiddenFill xmlns:a14="http://schemas.microsoft.com/office/drawing/2010/main">
+                <a:solidFill>
+                  <a:srgbClr val="FFFFFF"/>
+                </a:solidFill>
+              </a14:hiddenFill>
+            </a:ext>
+          </a:extLst>
+        </p:spPr>
+      </p:pic>
+      <p:pic>
+        <p:nvPicPr>
+          <p:cNvPr id="1034" name="Picture 10">
+            <a:extLst>
+              <a:ext uri="{FF2B5EF4-FFF2-40B4-BE49-F238E27FC236}">
+                <a16:creationId xmlns:a16="http://schemas.microsoft.com/office/drawing/2014/main" id="{BF98F9A7-C1AC-44FA-ADC5-DE669DFF785F}"/>
+              </a:ext>
+            </a:extLst>
+          </p:cNvPr>
+          <p:cNvPicPr>
+            <a:picLocks noChangeAspect="1" noChangeArrowheads="1"/>
+          </p:cNvPicPr>
+          <p:nvPr/>
+        </p:nvPicPr>
+        <p:blipFill>
+          <a:blip r:embed="rId4">
+            <a:extLst>
+              <a:ext uri="{28A0092B-C50C-407E-A947-70E740481C1C}">
+                <a14:useLocalDpi xmlns:a14="http://schemas.microsoft.com/office/drawing/2010/main" val="0"/>
+              </a:ext>
+            </a:extLst>
+          </a:blip>
+          <a:srcRect/>
+          <a:stretch>
+            <a:fillRect/>
+          </a:stretch>
+        </p:blipFill>
+        <p:spPr bwMode="auto">
+          <a:xfrm>
+            <a:off x="2226311" y="1433512"/>
+            <a:ext cx="3390900" cy="4867275"/>
+          </a:xfrm>
+          <a:prstGeom prst="rect">
+            <a:avLst/>
+          </a:prstGeom>
+          <a:noFill/>
+          <a:extLst>
+            <a:ext uri="{909E8E84-426E-40DD-AFC4-6F175D3DCCD1}">
+              <a14:hiddenFill xmlns:a14="http://schemas.microsoft.com/office/drawing/2010/main">
+                <a:solidFill>
+                  <a:srgbClr val="FFFFFF"/>
+                </a:solidFill>
+              </a14:hiddenFill>
+            </a:ext>
+          </a:extLst>
         </p:spPr>
       </p:pic>
     </p:spTree>
@@ -12931,6 +16134,126 @@
   <p:clrMapOvr>
     <a:masterClrMapping/>
   </p:clrMapOvr>
+  <p:timing>
+    <p:tnLst>
+      <p:par>
+        <p:cTn id="1" dur="indefinite" restart="never" nodeType="tmRoot">
+          <p:childTnLst>
+            <p:seq concurrent="1" nextAc="seek">
+              <p:cTn id="2" dur="indefinite" nodeType="mainSeq">
+                <p:childTnLst>
+                  <p:par>
+                    <p:cTn id="3" fill="hold">
+                      <p:stCondLst>
+                        <p:cond delay="indefinite"/>
+                      </p:stCondLst>
+                      <p:childTnLst>
+                        <p:par>
+                          <p:cTn id="4" fill="hold">
+                            <p:stCondLst>
+                              <p:cond delay="0"/>
+                            </p:stCondLst>
+                            <p:childTnLst>
+                              <p:par>
+                                <p:cTn id="5" presetID="1" presetClass="entr" presetSubtype="0" fill="hold" nodeType="clickEffect">
+                                  <p:stCondLst>
+                                    <p:cond delay="0"/>
+                                  </p:stCondLst>
+                                  <p:childTnLst>
+                                    <p:set>
+                                      <p:cBhvr>
+                                        <p:cTn id="6" dur="1" fill="hold">
+                                          <p:stCondLst>
+                                            <p:cond delay="0"/>
+                                          </p:stCondLst>
+                                        </p:cTn>
+                                        <p:tgtEl>
+                                          <p:spTgt spid="1034"/>
+                                        </p:tgtEl>
+                                        <p:attrNameLst>
+                                          <p:attrName>style.visibility</p:attrName>
+                                        </p:attrNameLst>
+                                      </p:cBhvr>
+                                      <p:to>
+                                        <p:strVal val="visible"/>
+                                      </p:to>
+                                    </p:set>
+                                  </p:childTnLst>
+                                </p:cTn>
+                              </p:par>
+                            </p:childTnLst>
+                          </p:cTn>
+                        </p:par>
+                      </p:childTnLst>
+                    </p:cTn>
+                  </p:par>
+                  <p:par>
+                    <p:cTn id="7" fill="hold">
+                      <p:stCondLst>
+                        <p:cond delay="indefinite"/>
+                      </p:stCondLst>
+                      <p:childTnLst>
+                        <p:par>
+                          <p:cTn id="8" fill="hold">
+                            <p:stCondLst>
+                              <p:cond delay="0"/>
+                            </p:stCondLst>
+                            <p:childTnLst>
+                              <p:par>
+                                <p:cTn id="9" presetID="1" presetClass="entr" presetSubtype="0" fill="hold" nodeType="clickEffect">
+                                  <p:stCondLst>
+                                    <p:cond delay="0"/>
+                                  </p:stCondLst>
+                                  <p:childTnLst>
+                                    <p:set>
+                                      <p:cBhvr>
+                                        <p:cTn id="10" dur="1" fill="hold">
+                                          <p:stCondLst>
+                                            <p:cond delay="0"/>
+                                          </p:stCondLst>
+                                        </p:cTn>
+                                        <p:tgtEl>
+                                          <p:spTgt spid="1032"/>
+                                        </p:tgtEl>
+                                        <p:attrNameLst>
+                                          <p:attrName>style.visibility</p:attrName>
+                                        </p:attrNameLst>
+                                      </p:cBhvr>
+                                      <p:to>
+                                        <p:strVal val="visible"/>
+                                      </p:to>
+                                    </p:set>
+                                  </p:childTnLst>
+                                </p:cTn>
+                              </p:par>
+                            </p:childTnLst>
+                          </p:cTn>
+                        </p:par>
+                      </p:childTnLst>
+                    </p:cTn>
+                  </p:par>
+                </p:childTnLst>
+              </p:cTn>
+              <p:prevCondLst>
+                <p:cond evt="onPrev" delay="0">
+                  <p:tgtEl>
+                    <p:sldTgt/>
+                  </p:tgtEl>
+                </p:cond>
+              </p:prevCondLst>
+              <p:nextCondLst>
+                <p:cond evt="onNext" delay="0">
+                  <p:tgtEl>
+                    <p:sldTgt/>
+                  </p:tgtEl>
+                </p:cond>
+              </p:nextCondLst>
+            </p:seq>
+          </p:childTnLst>
+        </p:cTn>
+      </p:par>
+    </p:tnLst>
+  </p:timing>
 </p:sld>
 </file>
 
@@ -14013,21 +17336,6 @@
 </file>
 
 <file path=customXml/item1.xml><?xml version="1.0" encoding="utf-8"?>
-<p:properties xmlns:p="http://schemas.microsoft.com/office/2006/metadata/properties" xmlns:xsi="http://www.w3.org/2001/XMLSchema-instance" xmlns:pc="http://schemas.microsoft.com/office/infopath/2007/PartnerControls">
-  <documentManagement/>
-</p:properties>
-</file>
-
-<file path=customXml/item2.xml><?xml version="1.0" encoding="utf-8"?>
-<?mso-contentType ?>
-<FormTemplates xmlns="http://schemas.microsoft.com/sharepoint/v3/contenttype/forms">
-  <Display>DocumentLibraryForm</Display>
-  <Edit>DocumentLibraryForm</Edit>
-  <New>DocumentLibraryForm</New>
-</FormTemplates>
-</file>
-
-<file path=customXml/item3.xml><?xml version="1.0" encoding="utf-8"?>
 <ct:contentTypeSchema xmlns:ct="http://schemas.microsoft.com/office/2006/metadata/contentType" xmlns:ma="http://schemas.microsoft.com/office/2006/metadata/properties/metaAttributes" ct:_="" ma:_="" ma:contentTypeName="Document" ma:contentTypeID="0x01010016C8866D03E34B48841686518579C82E" ma:contentTypeVersion="9" ma:contentTypeDescription="Create a new document." ma:contentTypeScope="" ma:versionID="fdc90dfaa38f62fbf710a40f032d942a">
   <xsd:schema xmlns:xsd="http://www.w3.org/2001/XMLSchema" xmlns:xs="http://www.w3.org/2001/XMLSchema" xmlns:p="http://schemas.microsoft.com/office/2006/metadata/properties" xmlns:ns3="d6825be3-6367-44d3-85f5-b39c113bb9e2" xmlns:ns4="fc4421ab-83fb-4986-8788-82ed978005be" targetNamespace="http://schemas.microsoft.com/office/2006/metadata/properties" ma:root="true" ma:fieldsID="23bf39b307e2c9cf8ede89b1c3f8734b" ns3:_="" ns4:_="">
     <xsd:import namespace="d6825be3-6367-44d3-85f5-b39c113bb9e2"/>
@@ -14224,24 +17532,22 @@
 </ct:contentTypeSchema>
 </file>
 
-<file path=customXml/itemProps1.xml><?xml version="1.0" encoding="utf-8"?>
-<ds:datastoreItem xmlns:ds="http://schemas.openxmlformats.org/officeDocument/2006/customXml" ds:itemID="{28591F37-1B9F-40A3-900D-791619430ABD}">
-  <ds:schemaRefs>
-    <ds:schemaRef ds:uri="http://schemas.microsoft.com/office/2006/metadata/properties"/>
-    <ds:schemaRef ds:uri="http://schemas.microsoft.com/office/infopath/2007/PartnerControls"/>
-  </ds:schemaRefs>
-</ds:datastoreItem>
+<file path=customXml/item2.xml><?xml version="1.0" encoding="utf-8"?>
+<?mso-contentType ?>
+<FormTemplates xmlns="http://schemas.microsoft.com/sharepoint/v3/contenttype/forms">
+  <Display>DocumentLibraryForm</Display>
+  <Edit>DocumentLibraryForm</Edit>
+  <New>DocumentLibraryForm</New>
+</FormTemplates>
 </file>
 
-<file path=customXml/itemProps2.xml><?xml version="1.0" encoding="utf-8"?>
-<ds:datastoreItem xmlns:ds="http://schemas.openxmlformats.org/officeDocument/2006/customXml" ds:itemID="{A91E972C-1908-4138-8F23-71EEEC3AAB70}">
-  <ds:schemaRefs>
-    <ds:schemaRef ds:uri="http://schemas.microsoft.com/sharepoint/v3/contenttype/forms"/>
-  </ds:schemaRefs>
-</ds:datastoreItem>
+<file path=customXml/item3.xml><?xml version="1.0" encoding="utf-8"?>
+<p:properties xmlns:p="http://schemas.microsoft.com/office/2006/metadata/properties" xmlns:xsi="http://www.w3.org/2001/XMLSchema-instance" xmlns:pc="http://schemas.microsoft.com/office/infopath/2007/PartnerControls">
+  <documentManagement/>
+</p:properties>
 </file>
 
-<file path=customXml/itemProps3.xml><?xml version="1.0" encoding="utf-8"?>
+<file path=customXml/itemProps1.xml><?xml version="1.0" encoding="utf-8"?>
 <ds:datastoreItem xmlns:ds="http://schemas.openxmlformats.org/officeDocument/2006/customXml" ds:itemID="{EF40A0E1-43B2-4845-A4D9-24DE681333A9}">
   <ds:schemaRefs>
     <ds:schemaRef ds:uri="http://schemas.microsoft.com/office/2006/metadata/contentType"/>
@@ -14258,4 +17564,21 @@
     <ds:schemaRef ds:uri="http://schemas.microsoft.com/internal/obd"/>
   </ds:schemaRefs>
 </ds:datastoreItem>
+</file>
+
+<file path=customXml/itemProps2.xml><?xml version="1.0" encoding="utf-8"?>
+<ds:datastoreItem xmlns:ds="http://schemas.openxmlformats.org/officeDocument/2006/customXml" ds:itemID="{A91E972C-1908-4138-8F23-71EEEC3AAB70}">
+  <ds:schemaRefs>
+    <ds:schemaRef ds:uri="http://schemas.microsoft.com/sharepoint/v3/contenttype/forms"/>
+  </ds:schemaRefs>
+</ds:datastoreItem>
+</file>
+
+<file path=customXml/itemProps3.xml><?xml version="1.0" encoding="utf-8"?>
+<ds:datastoreItem xmlns:ds="http://schemas.openxmlformats.org/officeDocument/2006/customXml" ds:itemID="{28591F37-1B9F-40A3-900D-791619430ABD}">
+  <ds:schemaRefs>
+    <ds:schemaRef ds:uri="http://schemas.microsoft.com/office/2006/metadata/properties"/>
+    <ds:schemaRef ds:uri="http://schemas.microsoft.com/office/infopath/2007/PartnerControls"/>
+  </ds:schemaRefs>
+</ds:datastoreItem>
 </file>
</xml_diff>